<commit_message>
Update settings for play store publishing (0.1.0)
</commit_message>
<xml_diff>
--- a/Artwork/artwork.pptx
+++ b/Artwork/artwork.pptx
@@ -5,17 +5,20 @@
     <p:sldMasterId id="2147483648" r:id="rId1"/>
   </p:sldMasterIdLst>
   <p:sldIdLst>
-    <p:sldId id="256" r:id="rId2"/>
-    <p:sldId id="257" r:id="rId3"/>
-    <p:sldId id="259" r:id="rId4"/>
-    <p:sldId id="258" r:id="rId5"/>
-    <p:sldId id="260" r:id="rId6"/>
-    <p:sldId id="261" r:id="rId7"/>
+    <p:sldId id="262" r:id="rId2"/>
+    <p:sldId id="263" r:id="rId3"/>
+    <p:sldId id="261" r:id="rId4"/>
+    <p:sldId id="264" r:id="rId5"/>
+    <p:sldId id="256" r:id="rId6"/>
+    <p:sldId id="257" r:id="rId7"/>
+    <p:sldId id="259" r:id="rId8"/>
+    <p:sldId id="258" r:id="rId9"/>
+    <p:sldId id="260" r:id="rId10"/>
   </p:sldIdLst>
   <p:sldSz cx="9144000" cy="6858000" type="screen4x3"/>
   <p:notesSz cx="6858000" cy="9144000"/>
   <p:custDataLst>
-    <p:tags r:id="rId8"/>
+    <p:tags r:id="rId11"/>
   </p:custDataLst>
   <p:defaultTextStyle>
     <a:defPPr>
@@ -115,6 +118,18 @@
   <p:extLst>
     <p:ext uri="{521415D9-36F7-43E2-AB2F-B90AF26B5E84}">
       <p14:sectionLst xmlns:p14="http://schemas.microsoft.com/office/powerpoint/2010/main">
+        <p14:section name="Screenshots and store listing" id="{29CC32E7-E16A-4EAA-8D3E-56752555518D}">
+          <p14:sldIdLst>
+            <p14:sldId id="262"/>
+            <p14:sldId id="263"/>
+          </p14:sldIdLst>
+        </p14:section>
+        <p14:section name="Icon and Splash" id="{315C89BD-039C-4C68-A31F-F76911C63A39}">
+          <p14:sldIdLst>
+            <p14:sldId id="261"/>
+            <p14:sldId id="264"/>
+          </p14:sldIdLst>
+        </p14:section>
         <p14:section name="In-App Icons" id="{C8630FBC-18EA-4AC4-BF38-CD2440C8753B}">
           <p14:sldIdLst>
             <p14:sldId id="256"/>
@@ -122,7 +137,6 @@
             <p14:sldId id="259"/>
             <p14:sldId id="258"/>
             <p14:sldId id="260"/>
-            <p14:sldId id="261"/>
           </p14:sldIdLst>
         </p14:section>
       </p14:sectionLst>
@@ -325,7 +339,7 @@
             <a:fld id="{1D8BD707-D9CF-40AE-B4C6-C98DA3205C09}" type="datetimeFigureOut">
               <a:rPr lang="en-US" smtClean="0"/>
               <a:pPr/>
-              <a:t>7/27/2016</a:t>
+              <a:t>9/21/2016</a:t>
             </a:fld>
             <a:endParaRPr lang="en-US"/>
           </a:p>
@@ -490,7 +504,7 @@
             <a:fld id="{1D8BD707-D9CF-40AE-B4C6-C98DA3205C09}" type="datetimeFigureOut">
               <a:rPr lang="en-US" smtClean="0"/>
               <a:pPr/>
-              <a:t>7/27/2016</a:t>
+              <a:t>9/21/2016</a:t>
             </a:fld>
             <a:endParaRPr lang="en-US"/>
           </a:p>
@@ -665,7 +679,7 @@
             <a:fld id="{1D8BD707-D9CF-40AE-B4C6-C98DA3205C09}" type="datetimeFigureOut">
               <a:rPr lang="en-US" smtClean="0"/>
               <a:pPr/>
-              <a:t>7/27/2016</a:t>
+              <a:t>9/21/2016</a:t>
             </a:fld>
             <a:endParaRPr lang="en-US"/>
           </a:p>
@@ -830,7 +844,7 @@
             <a:fld id="{1D8BD707-D9CF-40AE-B4C6-C98DA3205C09}" type="datetimeFigureOut">
               <a:rPr lang="en-US" smtClean="0"/>
               <a:pPr/>
-              <a:t>7/27/2016</a:t>
+              <a:t>9/21/2016</a:t>
             </a:fld>
             <a:endParaRPr lang="en-US"/>
           </a:p>
@@ -1072,7 +1086,7 @@
             <a:fld id="{1D8BD707-D9CF-40AE-B4C6-C98DA3205C09}" type="datetimeFigureOut">
               <a:rPr lang="en-US" smtClean="0"/>
               <a:pPr/>
-              <a:t>7/27/2016</a:t>
+              <a:t>9/21/2016</a:t>
             </a:fld>
             <a:endParaRPr lang="en-US"/>
           </a:p>
@@ -1354,7 +1368,7 @@
             <a:fld id="{1D8BD707-D9CF-40AE-B4C6-C98DA3205C09}" type="datetimeFigureOut">
               <a:rPr lang="en-US" smtClean="0"/>
               <a:pPr/>
-              <a:t>7/27/2016</a:t>
+              <a:t>9/21/2016</a:t>
             </a:fld>
             <a:endParaRPr lang="en-US"/>
           </a:p>
@@ -1770,7 +1784,7 @@
             <a:fld id="{1D8BD707-D9CF-40AE-B4C6-C98DA3205C09}" type="datetimeFigureOut">
               <a:rPr lang="en-US" smtClean="0"/>
               <a:pPr/>
-              <a:t>7/27/2016</a:t>
+              <a:t>9/21/2016</a:t>
             </a:fld>
             <a:endParaRPr lang="en-US"/>
           </a:p>
@@ -1884,7 +1898,7 @@
             <a:fld id="{1D8BD707-D9CF-40AE-B4C6-C98DA3205C09}" type="datetimeFigureOut">
               <a:rPr lang="en-US" smtClean="0"/>
               <a:pPr/>
-              <a:t>7/27/2016</a:t>
+              <a:t>9/21/2016</a:t>
             </a:fld>
             <a:endParaRPr lang="en-US"/>
           </a:p>
@@ -1976,7 +1990,7 @@
             <a:fld id="{1D8BD707-D9CF-40AE-B4C6-C98DA3205C09}" type="datetimeFigureOut">
               <a:rPr lang="en-US" smtClean="0"/>
               <a:pPr/>
-              <a:t>7/27/2016</a:t>
+              <a:t>9/21/2016</a:t>
             </a:fld>
             <a:endParaRPr lang="en-US"/>
           </a:p>
@@ -2248,7 +2262,7 @@
             <a:fld id="{1D8BD707-D9CF-40AE-B4C6-C98DA3205C09}" type="datetimeFigureOut">
               <a:rPr lang="en-US" smtClean="0"/>
               <a:pPr/>
-              <a:t>7/27/2016</a:t>
+              <a:t>9/21/2016</a:t>
             </a:fld>
             <a:endParaRPr lang="en-US"/>
           </a:p>
@@ -2497,7 +2511,7 @@
             <a:fld id="{1D8BD707-D9CF-40AE-B4C6-C98DA3205C09}" type="datetimeFigureOut">
               <a:rPr lang="en-US" smtClean="0"/>
               <a:pPr/>
-              <a:t>7/27/2016</a:t>
+              <a:t>9/21/2016</a:t>
             </a:fld>
             <a:endParaRPr lang="en-US"/>
           </a:p>
@@ -2705,7 +2719,7 @@
             <a:fld id="{1D8BD707-D9CF-40AE-B4C6-C98DA3205C09}" type="datetimeFigureOut">
               <a:rPr lang="en-US" smtClean="0"/>
               <a:pPr/>
-              <a:t>7/27/2016</a:t>
+              <a:t>9/21/2016</a:t>
             </a:fld>
             <a:endParaRPr lang="en-US"/>
           </a:p>
@@ -3062,17 +3076,6 @@
 <file path=ppt/slides/slide1.xml><?xml version="1.0" encoding="utf-8"?>
 <p:sld xmlns:a="http://schemas.openxmlformats.org/drawingml/2006/main" xmlns:r="http://schemas.openxmlformats.org/officeDocument/2006/relationships" xmlns:p="http://schemas.openxmlformats.org/presentationml/2006/main">
   <p:cSld>
-    <p:bg>
-      <p:bgPr>
-        <a:solidFill>
-          <a:schemeClr val="tx2">
-            <a:lumMod val="20000"/>
-            <a:lumOff val="80000"/>
-          </a:schemeClr>
-        </a:solidFill>
-        <a:effectLst/>
-      </p:bgPr>
-    </p:bg>
     <p:spTree>
       <p:nvGrpSpPr>
         <p:cNvPr id="1" name=""/>
@@ -3089,238 +3092,22 @@
       </p:grpSpPr>
       <p:pic>
         <p:nvPicPr>
-          <p:cNvPr id="1026" name="Picture 2"/>
-          <p:cNvPicPr>
-            <a:picLocks noChangeAspect="1" noChangeArrowheads="1"/>
-          </p:cNvPicPr>
-          <p:nvPr/>
-        </p:nvPicPr>
-        <p:blipFill rotWithShape="1">
-          <a:blip r:embed="rId3">
-            <a:extLst>
-              <a:ext uri="{BEBA8EAE-BF5A-486C-A8C5-ECC9F3942E4B}">
-                <a14:imgProps xmlns:a14="http://schemas.microsoft.com/office/drawing/2010/main">
-                  <a14:imgLayer r:embed="rId4">
-                    <a14:imgEffect>
-                      <a14:backgroundRemoval t="0" b="100000" l="0" r="100000">
-                        <a14:foregroundMark x1="4532" y1="93030" x2="74622" y2="23636"/>
-                        <a14:foregroundMark x1="20544" y1="19394" x2="38973" y2="7273"/>
-                        <a14:foregroundMark x1="49547" y1="4848" x2="49547" y2="4848"/>
-                        <a14:foregroundMark x1="51057" y1="3030" x2="51057" y2="3030"/>
-                        <a14:foregroundMark x1="54079" y1="4242" x2="81269" y2="29091"/>
-                        <a14:foregroundMark x1="82477" y1="33030" x2="12689" y2="32121"/>
-                        <a14:foregroundMark x1="37160" y1="12121" x2="67674" y2="64545"/>
-                      </a14:backgroundRemoval>
-                    </a14:imgEffect>
-                  </a14:imgLayer>
-                </a14:imgProps>
-              </a:ext>
-              <a:ext uri="{28A0092B-C50C-407E-A947-70E740481C1C}">
-                <a14:useLocalDpi xmlns:a14="http://schemas.microsoft.com/office/drawing/2010/main" val="0"/>
-              </a:ext>
-            </a:extLst>
-          </a:blip>
-          <a:srcRect l="151" r="151"/>
-          <a:stretch/>
-        </p:blipFill>
-        <p:spPr bwMode="auto">
-          <a:xfrm>
-            <a:off x="685800" y="609600"/>
-            <a:ext cx="1800000" cy="1800000"/>
-          </a:xfrm>
-          <a:prstGeom prst="rect">
-            <a:avLst/>
-          </a:prstGeom>
-          <a:noFill/>
-          <a:ln>
-            <a:noFill/>
-          </a:ln>
-          <a:extLst>
-            <a:ext uri="{909E8E84-426E-40DD-AFC4-6F175D3DCCD1}">
-              <a14:hiddenFill xmlns:a14="http://schemas.microsoft.com/office/drawing/2010/main">
-                <a:solidFill>
-                  <a:schemeClr val="accent1"/>
-                </a:solidFill>
-              </a14:hiddenFill>
-            </a:ext>
-            <a:ext uri="{91240B29-F687-4F45-9708-019B960494DF}">
-              <a14:hiddenLine xmlns:a14="http://schemas.microsoft.com/office/drawing/2010/main" w="9525">
-                <a:solidFill>
-                  <a:schemeClr val="tx1"/>
-                </a:solidFill>
-                <a:miter lim="800000"/>
-                <a:headEnd/>
-                <a:tailEnd/>
-              </a14:hiddenLine>
-            </a:ext>
-          </a:extLst>
-        </p:spPr>
-      </p:pic>
-      <p:pic>
-        <p:nvPicPr>
-          <p:cNvPr id="1027" name="Picture 3"/>
-          <p:cNvPicPr>
-            <a:picLocks noChangeAspect="1" noChangeArrowheads="1"/>
-          </p:cNvPicPr>
-          <p:nvPr/>
-        </p:nvPicPr>
-        <p:blipFill rotWithShape="1">
-          <a:blip r:embed="rId5">
-            <a:extLst>
-              <a:ext uri="{BEBA8EAE-BF5A-486C-A8C5-ECC9F3942E4B}">
-                <a14:imgProps xmlns:a14="http://schemas.microsoft.com/office/drawing/2010/main">
-                  <a14:imgLayer r:embed="rId6">
-                    <a14:imgEffect>
-                      <a14:backgroundRemoval t="0" b="100000" l="0" r="100000">
-                        <a14:foregroundMark x1="5714" y1="5882" x2="87143" y2="95588"/>
-                        <a14:foregroundMark x1="10952" y1="95588" x2="86667" y2="8824"/>
-                        <a14:foregroundMark x1="64286" y1="8824" x2="85714" y2="72059"/>
-                        <a14:foregroundMark x1="52381" y1="89216" x2="83333" y2="35294"/>
-                        <a14:foregroundMark x1="37143" y1="87255" x2="20476" y2="38725"/>
-                        <a14:foregroundMark x1="3810" y1="62745" x2="3810" y2="62745"/>
-                        <a14:foregroundMark x1="4286" y1="56373" x2="4286" y2="46078"/>
-                        <a14:foregroundMark x1="3333" y1="42157" x2="3333" y2="42157"/>
-                        <a14:foregroundMark x1="3810" y1="4412" x2="3810" y2="4412"/>
-                        <a14:foregroundMark x1="3810" y1="4902" x2="3810" y2="47549"/>
-                        <a14:foregroundMark x1="3333" y1="3922" x2="84762" y2="3431"/>
-                        <a14:foregroundMark x1="86190" y1="3922" x2="95714" y2="3922"/>
-                        <a14:foregroundMark x1="95714" y1="3922" x2="95714" y2="98039"/>
-                        <a14:foregroundMark x1="95238" y1="97549" x2="3810" y2="96078"/>
-                        <a14:foregroundMark x1="3810" y1="96078" x2="3810" y2="57843"/>
-                        <a14:foregroundMark x1="5714" y1="57353" x2="87619" y2="86765"/>
-                        <a14:foregroundMark x1="23810" y1="91667" x2="71905" y2="60294"/>
-                        <a14:foregroundMark x1="84762" y1="86275" x2="75714" y2="16176"/>
-                        <a14:foregroundMark x1="97143" y1="24510" x2="96190" y2="73039"/>
-                        <a14:foregroundMark x1="47619" y1="42647" x2="30476" y2="18627"/>
-                        <a14:backgroundMark x1="2381" y1="1471" x2="96667" y2="980"/>
-                        <a14:backgroundMark x1="99048" y1="14706" x2="98571" y2="99020"/>
-                        <a14:backgroundMark x1="4286" y1="99510" x2="84762" y2="99510"/>
-                      </a14:backgroundRemoval>
-                    </a14:imgEffect>
-                  </a14:imgLayer>
-                </a14:imgProps>
-              </a:ext>
-              <a:ext uri="{28A0092B-C50C-407E-A947-70E740481C1C}">
-                <a14:useLocalDpi xmlns:a14="http://schemas.microsoft.com/office/drawing/2010/main" val="0"/>
-              </a:ext>
-            </a:extLst>
-          </a:blip>
-          <a:srcRect l="1428" r="1428"/>
-          <a:stretch/>
-        </p:blipFill>
-        <p:spPr bwMode="auto">
-          <a:xfrm>
-            <a:off x="2711548" y="609600"/>
-            <a:ext cx="1800000" cy="1800000"/>
-          </a:xfrm>
-          <a:prstGeom prst="rect">
-            <a:avLst/>
-          </a:prstGeom>
-          <a:noFill/>
-          <a:ln>
-            <a:noFill/>
-          </a:ln>
-          <a:extLst>
-            <a:ext uri="{909E8E84-426E-40DD-AFC4-6F175D3DCCD1}">
-              <a14:hiddenFill xmlns:a14="http://schemas.microsoft.com/office/drawing/2010/main">
-                <a:solidFill>
-                  <a:schemeClr val="accent1"/>
-                </a:solidFill>
-              </a14:hiddenFill>
-            </a:ext>
-            <a:ext uri="{91240B29-F687-4F45-9708-019B960494DF}">
-              <a14:hiddenLine xmlns:a14="http://schemas.microsoft.com/office/drawing/2010/main" w="9525">
-                <a:solidFill>
-                  <a:schemeClr val="tx1"/>
-                </a:solidFill>
-                <a:miter lim="800000"/>
-                <a:headEnd/>
-                <a:tailEnd/>
-              </a14:hiddenLine>
-            </a:ext>
-          </a:extLst>
-        </p:spPr>
-      </p:pic>
-      <p:pic>
-        <p:nvPicPr>
-          <p:cNvPr id="2050" name="Picture 2"/>
-          <p:cNvPicPr>
-            <a:picLocks noChangeAspect="1" noChangeArrowheads="1"/>
-          </p:cNvPicPr>
-          <p:nvPr/>
-        </p:nvPicPr>
-        <p:blipFill rotWithShape="1">
-          <a:blip r:embed="rId7">
-            <a:extLst>
-              <a:ext uri="{28A0092B-C50C-407E-A947-70E740481C1C}">
-                <a14:useLocalDpi xmlns:a14="http://schemas.microsoft.com/office/drawing/2010/main" val="0"/>
-              </a:ext>
-            </a:extLst>
-          </a:blip>
-          <a:srcRect l="679" t="-42640" r="-251" b="-44391"/>
-          <a:stretch/>
-        </p:blipFill>
-        <p:spPr bwMode="auto">
-          <a:xfrm>
-            <a:off x="4737296" y="601744"/>
-            <a:ext cx="1800000" cy="1800000"/>
-          </a:xfrm>
-          <a:prstGeom prst="rect">
-            <a:avLst/>
-          </a:prstGeom>
-          <a:noFill/>
-          <a:ln>
-            <a:noFill/>
-          </a:ln>
-          <a:extLst>
-            <a:ext uri="{909E8E84-426E-40DD-AFC4-6F175D3DCCD1}">
-              <a14:hiddenFill xmlns:a14="http://schemas.microsoft.com/office/drawing/2010/main">
-                <a:solidFill>
-                  <a:schemeClr val="accent1"/>
-                </a:solidFill>
-              </a14:hiddenFill>
-            </a:ext>
-            <a:ext uri="{91240B29-F687-4F45-9708-019B960494DF}">
-              <a14:hiddenLine xmlns:a14="http://schemas.microsoft.com/office/drawing/2010/main" w="9525">
-                <a:solidFill>
-                  <a:schemeClr val="tx1"/>
-                </a:solidFill>
-                <a:miter lim="800000"/>
-                <a:headEnd/>
-                <a:tailEnd/>
-              </a14:hiddenLine>
-            </a:ext>
-          </a:extLst>
-        </p:spPr>
-      </p:pic>
-      <p:pic>
-        <p:nvPicPr>
-          <p:cNvPr id="2" name="Picture 1"/>
+          <p:cNvPr id="6" name="Picture 5"/>
           <p:cNvPicPr>
             <a:picLocks noChangeAspect="1"/>
           </p:cNvPicPr>
           <p:nvPr/>
         </p:nvPicPr>
-        <p:blipFill rotWithShape="1">
-          <a:blip r:embed="rId8">
-            <a:clrChange>
-              <a:clrFrom>
-                <a:srgbClr val="FFFFFF"/>
-              </a:clrFrom>
-              <a:clrTo>
-                <a:srgbClr val="FFFFFF">
-                  <a:alpha val="0"/>
-                </a:srgbClr>
-              </a:clrTo>
-            </a:clrChange>
-          </a:blip>
-          <a:srcRect l="22242" t="11576" r="20918" b="18181"/>
-          <a:stretch/>
+        <p:blipFill>
+          <a:blip r:embed="rId2"/>
+          <a:stretch>
+            <a:fillRect/>
+          </a:stretch>
         </p:blipFill>
         <p:spPr>
           <a:xfrm>
-            <a:off x="665375" y="2743200"/>
-            <a:ext cx="1800000" cy="1800000"/>
+            <a:off x="76200" y="304801"/>
+            <a:ext cx="2057400" cy="3631018"/>
           </a:xfrm>
           <a:prstGeom prst="rect">
             <a:avLst/>
@@ -3329,22 +3116,22 @@
       </p:pic>
       <p:pic>
         <p:nvPicPr>
-          <p:cNvPr id="3" name="Picture 2"/>
+          <p:cNvPr id="7" name="Picture 6"/>
           <p:cNvPicPr>
             <a:picLocks noChangeAspect="1"/>
           </p:cNvPicPr>
           <p:nvPr/>
         </p:nvPicPr>
         <p:blipFill>
-          <a:blip r:embed="rId9"/>
+          <a:blip r:embed="rId3"/>
           <a:stretch>
             <a:fillRect/>
           </a:stretch>
         </p:blipFill>
         <p:spPr>
           <a:xfrm>
-            <a:off x="7556692" y="5638800"/>
-            <a:ext cx="1025333" cy="1019175"/>
+            <a:off x="2286000" y="304801"/>
+            <a:ext cx="2071065" cy="3631018"/>
           </a:xfrm>
           <a:prstGeom prst="rect">
             <a:avLst/>
@@ -3353,22 +3140,22 @@
       </p:pic>
       <p:pic>
         <p:nvPicPr>
-          <p:cNvPr id="4" name="Picture 3"/>
+          <p:cNvPr id="8" name="Picture 7"/>
           <p:cNvPicPr>
             <a:picLocks noChangeAspect="1"/>
           </p:cNvPicPr>
           <p:nvPr/>
         </p:nvPicPr>
         <p:blipFill>
-          <a:blip r:embed="rId10"/>
+          <a:blip r:embed="rId4"/>
           <a:stretch>
             <a:fillRect/>
           </a:stretch>
         </p:blipFill>
         <p:spPr>
           <a:xfrm>
-            <a:off x="6248400" y="5616019"/>
-            <a:ext cx="1068304" cy="1068304"/>
+            <a:off x="6726003" y="304801"/>
+            <a:ext cx="2042781" cy="3631018"/>
           </a:xfrm>
           <a:prstGeom prst="rect">
             <a:avLst/>
@@ -3377,32 +3164,22 @@
       </p:pic>
       <p:pic>
         <p:nvPicPr>
-          <p:cNvPr id="6" name="Picture 5"/>
+          <p:cNvPr id="9" name="Picture 8"/>
           <p:cNvPicPr>
             <a:picLocks noChangeAspect="1"/>
           </p:cNvPicPr>
           <p:nvPr/>
         </p:nvPicPr>
-        <p:blipFill rotWithShape="1">
-          <a:blip r:embed="rId11">
-            <a:clrChange>
-              <a:clrFrom>
-                <a:srgbClr val="FFFFFF"/>
-              </a:clrFrom>
-              <a:clrTo>
-                <a:srgbClr val="FFFFFF">
-                  <a:alpha val="0"/>
-                </a:srgbClr>
-              </a:clrTo>
-            </a:clrChange>
-          </a:blip>
-          <a:srcRect l="14667" t="12878" r="12878" b="14667"/>
-          <a:stretch/>
+        <p:blipFill>
+          <a:blip r:embed="rId5"/>
+          <a:stretch>
+            <a:fillRect/>
+          </a:stretch>
         </p:blipFill>
         <p:spPr>
           <a:xfrm>
-            <a:off x="3048000" y="2780907"/>
-            <a:ext cx="1800000" cy="1800000"/>
+            <a:off x="4509465" y="304801"/>
+            <a:ext cx="2071772" cy="3647182"/>
           </a:xfrm>
           <a:prstGeom prst="rect">
             <a:avLst/>
@@ -3410,12 +3187,9 @@
         </p:spPr>
       </p:pic>
     </p:spTree>
-    <p:custDataLst>
-      <p:tags r:id="rId1"/>
-    </p:custDataLst>
     <p:extLst>
       <p:ext uri="{BB962C8B-B14F-4D97-AF65-F5344CB8AC3E}">
-        <p14:creationId xmlns:p14="http://schemas.microsoft.com/office/powerpoint/2010/main" val="986498556"/>
+        <p14:creationId xmlns:p14="http://schemas.microsoft.com/office/powerpoint/2010/main" val="1302391802"/>
       </p:ext>
     </p:extLst>
   </p:cSld>
@@ -3442,54 +3216,244 @@
           <a:chExt cx="0" cy="0"/>
         </a:xfrm>
       </p:grpSpPr>
+      <p:grpSp>
+        <p:nvGrpSpPr>
+          <p:cNvPr id="13" name="Group 12"/>
+          <p:cNvGrpSpPr/>
+          <p:nvPr/>
+        </p:nvGrpSpPr>
+        <p:grpSpPr>
+          <a:xfrm>
+            <a:off x="152400" y="609600"/>
+            <a:ext cx="7380000" cy="3600000"/>
+            <a:chOff x="272400" y="1521045"/>
+            <a:chExt cx="7380000" cy="3600000"/>
+          </a:xfrm>
+        </p:grpSpPr>
+        <p:pic>
+          <p:nvPicPr>
+            <p:cNvPr id="8" name="Picture 7"/>
+            <p:cNvPicPr>
+              <a:picLocks noChangeAspect="1"/>
+            </p:cNvPicPr>
+            <p:nvPr/>
+          </p:nvPicPr>
+          <p:blipFill>
+            <a:blip r:embed="rId2"/>
+            <a:stretch>
+              <a:fillRect/>
+            </a:stretch>
+          </p:blipFill>
+          <p:spPr>
+            <a:xfrm rot="21062032">
+              <a:off x="5301477" y="1849887"/>
+              <a:ext cx="1705086" cy="3030769"/>
+            </a:xfrm>
+            <a:prstGeom prst="rect">
+              <a:avLst/>
+            </a:prstGeom>
+            <a:ln>
+              <a:solidFill>
+                <a:schemeClr val="tx1"/>
+              </a:solidFill>
+            </a:ln>
+          </p:spPr>
+        </p:pic>
+        <p:pic>
+          <p:nvPicPr>
+            <p:cNvPr id="9" name="Picture 8"/>
+            <p:cNvPicPr>
+              <a:picLocks noChangeAspect="1"/>
+            </p:cNvPicPr>
+            <p:nvPr/>
+          </p:nvPicPr>
+          <p:blipFill>
+            <a:blip r:embed="rId3"/>
+            <a:stretch>
+              <a:fillRect/>
+            </a:stretch>
+          </p:blipFill>
+          <p:spPr>
+            <a:xfrm rot="501189">
+              <a:off x="982488" y="1772234"/>
+              <a:ext cx="1729284" cy="3044261"/>
+            </a:xfrm>
+            <a:prstGeom prst="rect">
+              <a:avLst/>
+            </a:prstGeom>
+            <a:ln>
+              <a:solidFill>
+                <a:schemeClr val="tx1"/>
+              </a:solidFill>
+            </a:ln>
+          </p:spPr>
+        </p:pic>
+        <p:pic>
+          <p:nvPicPr>
+            <p:cNvPr id="3" name="Picture 2"/>
+            <p:cNvPicPr>
+              <a:picLocks noChangeAspect="1"/>
+            </p:cNvPicPr>
+            <p:nvPr/>
+          </p:nvPicPr>
+          <p:blipFill rotWithShape="1">
+            <a:blip r:embed="rId4"/>
+            <a:srcRect l="3679"/>
+            <a:stretch/>
+          </p:blipFill>
+          <p:spPr>
+            <a:xfrm rot="21294864">
+              <a:off x="2143478" y="1946197"/>
+              <a:ext cx="1590975" cy="2895864"/>
+            </a:xfrm>
+            <a:prstGeom prst="rect">
+              <a:avLst/>
+            </a:prstGeom>
+            <a:ln>
+              <a:solidFill>
+                <a:schemeClr val="tx1"/>
+              </a:solidFill>
+            </a:ln>
+          </p:spPr>
+        </p:pic>
+        <p:pic>
+          <p:nvPicPr>
+            <p:cNvPr id="12" name="Picture 11"/>
+            <p:cNvPicPr>
+              <a:picLocks noChangeAspect="1"/>
+            </p:cNvPicPr>
+            <p:nvPr/>
+          </p:nvPicPr>
+          <p:blipFill>
+            <a:blip r:embed="rId5"/>
+            <a:stretch>
+              <a:fillRect/>
+            </a:stretch>
+          </p:blipFill>
+          <p:spPr>
+            <a:xfrm rot="517990">
+              <a:off x="4078348" y="1803822"/>
+              <a:ext cx="1764157" cy="3046770"/>
+            </a:xfrm>
+            <a:prstGeom prst="rect">
+              <a:avLst/>
+            </a:prstGeom>
+            <a:ln>
+              <a:solidFill>
+                <a:schemeClr val="tx1"/>
+              </a:solidFill>
+            </a:ln>
+          </p:spPr>
+        </p:pic>
+        <p:pic>
+          <p:nvPicPr>
+            <p:cNvPr id="2" name="Picture 1"/>
+            <p:cNvPicPr>
+              <a:picLocks noChangeAspect="1"/>
+            </p:cNvPicPr>
+            <p:nvPr/>
+          </p:nvPicPr>
+          <p:blipFill>
+            <a:blip r:embed="rId6"/>
+            <a:stretch>
+              <a:fillRect/>
+            </a:stretch>
+          </p:blipFill>
+          <p:spPr>
+            <a:xfrm rot="190812">
+              <a:off x="2863881" y="1849888"/>
+              <a:ext cx="1717288" cy="3030769"/>
+            </a:xfrm>
+            <a:prstGeom prst="rect">
+              <a:avLst/>
+            </a:prstGeom>
+            <a:ln>
+              <a:solidFill>
+                <a:schemeClr val="tx1"/>
+              </a:solidFill>
+            </a:ln>
+          </p:spPr>
+        </p:pic>
+        <p:sp>
+          <p:nvSpPr>
+            <p:cNvPr id="11" name="Rectangle 10"/>
+            <p:cNvSpPr/>
+            <p:nvPr/>
+          </p:nvSpPr>
+          <p:spPr>
+            <a:xfrm>
+              <a:off x="272400" y="1521045"/>
+              <a:ext cx="7380000" cy="3600000"/>
+            </a:xfrm>
+            <a:prstGeom prst="rect">
+              <a:avLst/>
+            </a:prstGeom>
+            <a:noFill/>
+            <a:ln>
+              <a:solidFill>
+                <a:schemeClr val="bg1"/>
+              </a:solidFill>
+            </a:ln>
+          </p:spPr>
+          <p:style>
+            <a:lnRef idx="2">
+              <a:schemeClr val="dk1"/>
+            </a:lnRef>
+            <a:fillRef idx="1">
+              <a:schemeClr val="lt1"/>
+            </a:fillRef>
+            <a:effectRef idx="0">
+              <a:schemeClr val="dk1"/>
+            </a:effectRef>
+            <a:fontRef idx="minor">
+              <a:schemeClr val="dk1"/>
+            </a:fontRef>
+          </p:style>
+          <p:txBody>
+            <a:bodyPr rtlCol="0" anchor="ctr"/>
+            <a:lstStyle/>
+            <a:p>
+              <a:pPr algn="ctr"/>
+              <a:r>
+                <a:rPr lang="en-GB" dirty="0"/>
+                <a:t>.</a:t>
+              </a:r>
+            </a:p>
+            <a:p>
+              <a:pPr algn="ctr"/>
+              <a:endParaRPr lang="en-GB" dirty="0"/>
+            </a:p>
+          </p:txBody>
+        </p:sp>
+      </p:grpSp>
       <p:pic>
         <p:nvPicPr>
-          <p:cNvPr id="1026" name="Picture 2" descr="http://vignette3.wikia.nocookie.net/wiisportsresortwalkthrough/images/6/60/No_Image_Available.png/revision/latest?cb=20140118173446"/>
+          <p:cNvPr id="15" name="Picture 14"/>
           <p:cNvPicPr>
-            <a:picLocks noChangeAspect="1" noChangeArrowheads="1"/>
+            <a:picLocks noChangeAspect="1"/>
           </p:cNvPicPr>
           <p:nvPr/>
         </p:nvPicPr>
         <p:blipFill>
-          <a:blip r:embed="rId3">
-            <a:extLst>
-              <a:ext uri="{28A0092B-C50C-407E-A947-70E740481C1C}">
-                <a14:useLocalDpi xmlns:a14="http://schemas.microsoft.com/office/drawing/2010/main" val="0"/>
-              </a:ext>
-            </a:extLst>
-          </a:blip>
-          <a:srcRect/>
+          <a:blip r:embed="rId7"/>
           <a:stretch>
             <a:fillRect/>
           </a:stretch>
         </p:blipFill>
-        <p:spPr bwMode="auto">
+        <p:spPr>
           <a:xfrm>
-            <a:off x="2895600" y="533400"/>
-            <a:ext cx="4876800" cy="4876801"/>
+            <a:off x="2438400" y="4648200"/>
+            <a:ext cx="3398841" cy="1664453"/>
           </a:xfrm>
           <a:prstGeom prst="rect">
             <a:avLst/>
           </a:prstGeom>
-          <a:noFill/>
-          <a:extLst>
-            <a:ext uri="{909E8E84-426E-40DD-AFC4-6F175D3DCCD1}">
-              <a14:hiddenFill xmlns:a14="http://schemas.microsoft.com/office/drawing/2010/main">
-                <a:solidFill>
-                  <a:srgbClr val="FFFFFF"/>
-                </a:solidFill>
-              </a14:hiddenFill>
-            </a:ext>
-          </a:extLst>
         </p:spPr>
       </p:pic>
     </p:spTree>
-    <p:custDataLst>
-      <p:tags r:id="rId1"/>
-    </p:custDataLst>
     <p:extLst>
       <p:ext uri="{BB962C8B-B14F-4D97-AF65-F5344CB8AC3E}">
-        <p14:creationId xmlns:p14="http://schemas.microsoft.com/office/powerpoint/2010/main" val="3792651508"/>
+        <p14:creationId xmlns:p14="http://schemas.microsoft.com/office/powerpoint/2010/main" val="3384180130"/>
       </p:ext>
     </p:extLst>
   </p:cSld>
@@ -3500,697 +3464,6 @@
 </file>
 
 <file path=ppt/slides/slide3.xml><?xml version="1.0" encoding="utf-8"?>
-<p:sld xmlns:a="http://schemas.openxmlformats.org/drawingml/2006/main" xmlns:r="http://schemas.openxmlformats.org/officeDocument/2006/relationships" xmlns:p="http://schemas.openxmlformats.org/presentationml/2006/main">
-  <p:cSld>
-    <p:spTree>
-      <p:nvGrpSpPr>
-        <p:cNvPr id="1" name=""/>
-        <p:cNvGrpSpPr/>
-        <p:nvPr/>
-      </p:nvGrpSpPr>
-      <p:grpSpPr>
-        <a:xfrm>
-          <a:off x="0" y="0"/>
-          <a:ext cx="0" cy="0"/>
-          <a:chOff x="0" y="0"/>
-          <a:chExt cx="0" cy="0"/>
-        </a:xfrm>
-      </p:grpSpPr>
-      <p:pic>
-        <p:nvPicPr>
-          <p:cNvPr id="2050" name="Picture 2"/>
-          <p:cNvPicPr>
-            <a:picLocks noChangeAspect="1" noChangeArrowheads="1"/>
-          </p:cNvPicPr>
-          <p:nvPr/>
-        </p:nvPicPr>
-        <p:blipFill>
-          <a:blip r:embed="rId3">
-            <a:extLst>
-              <a:ext uri="{28A0092B-C50C-407E-A947-70E740481C1C}">
-                <a14:useLocalDpi xmlns:a14="http://schemas.microsoft.com/office/drawing/2010/main" val="0"/>
-              </a:ext>
-            </a:extLst>
-          </a:blip>
-          <a:srcRect/>
-          <a:stretch>
-            <a:fillRect/>
-          </a:stretch>
-        </p:blipFill>
-        <p:spPr bwMode="auto">
-          <a:xfrm rot="21242906">
-            <a:off x="889800" y="1065328"/>
-            <a:ext cx="3124200" cy="4097311"/>
-          </a:xfrm>
-          <a:prstGeom prst="rect">
-            <a:avLst/>
-          </a:prstGeom>
-          <a:solidFill>
-            <a:srgbClr val="FFFFFF">
-              <a:shade val="85000"/>
-            </a:srgbClr>
-          </a:solidFill>
-          <a:ln w="88900" cap="sq">
-            <a:solidFill>
-              <a:srgbClr val="FFFFFF"/>
-            </a:solidFill>
-            <a:miter lim="800000"/>
-          </a:ln>
-          <a:effectLst>
-            <a:outerShdw blurRad="55000" dist="18000" dir="5400000" algn="tl" rotWithShape="0">
-              <a:srgbClr val="000000">
-                <a:alpha val="40000"/>
-              </a:srgbClr>
-            </a:outerShdw>
-          </a:effectLst>
-          <a:scene3d>
-            <a:camera prst="orthographicFront"/>
-            <a:lightRig rig="twoPt" dir="t">
-              <a:rot lat="0" lon="0" rev="7200000"/>
-            </a:lightRig>
-          </a:scene3d>
-          <a:sp3d>
-            <a:bevelT w="25400" h="19050"/>
-            <a:contourClr>
-              <a:srgbClr val="FFFFFF"/>
-            </a:contourClr>
-          </a:sp3d>
-          <a:extLst/>
-        </p:spPr>
-      </p:pic>
-      <p:pic>
-        <p:nvPicPr>
-          <p:cNvPr id="2054" name="Picture 6"/>
-          <p:cNvPicPr>
-            <a:picLocks noChangeAspect="1" noChangeArrowheads="1"/>
-          </p:cNvPicPr>
-          <p:nvPr/>
-        </p:nvPicPr>
-        <p:blipFill>
-          <a:blip r:embed="rId4">
-            <a:extLst>
-              <a:ext uri="{28A0092B-C50C-407E-A947-70E740481C1C}">
-                <a14:useLocalDpi xmlns:a14="http://schemas.microsoft.com/office/drawing/2010/main" val="0"/>
-              </a:ext>
-            </a:extLst>
-          </a:blip>
-          <a:srcRect/>
-          <a:stretch>
-            <a:fillRect/>
-          </a:stretch>
-        </p:blipFill>
-        <p:spPr bwMode="auto">
-          <a:xfrm rot="248090">
-            <a:off x="5029200" y="328612"/>
-            <a:ext cx="3084513" cy="5743575"/>
-          </a:xfrm>
-          <a:prstGeom prst="rect">
-            <a:avLst/>
-          </a:prstGeom>
-          <a:solidFill>
-            <a:srgbClr val="FFFFFF">
-              <a:shade val="85000"/>
-            </a:srgbClr>
-          </a:solidFill>
-          <a:ln w="88900" cap="sq">
-            <a:solidFill>
-              <a:srgbClr val="FFFFFF"/>
-            </a:solidFill>
-            <a:miter lim="800000"/>
-          </a:ln>
-          <a:effectLst>
-            <a:outerShdw blurRad="55000" dist="18000" dir="5400000" algn="tl" rotWithShape="0">
-              <a:srgbClr val="000000">
-                <a:alpha val="40000"/>
-              </a:srgbClr>
-            </a:outerShdw>
-          </a:effectLst>
-          <a:scene3d>
-            <a:camera prst="orthographicFront"/>
-            <a:lightRig rig="twoPt" dir="t">
-              <a:rot lat="0" lon="0" rev="7200000"/>
-            </a:lightRig>
-          </a:scene3d>
-          <a:sp3d>
-            <a:bevelT w="25400" h="19050"/>
-            <a:contourClr>
-              <a:srgbClr val="FFFFFF"/>
-            </a:contourClr>
-          </a:sp3d>
-          <a:extLst/>
-        </p:spPr>
-      </p:pic>
-    </p:spTree>
-    <p:custDataLst>
-      <p:tags r:id="rId1"/>
-    </p:custDataLst>
-    <p:extLst>
-      <p:ext uri="{BB962C8B-B14F-4D97-AF65-F5344CB8AC3E}">
-        <p14:creationId xmlns:p14="http://schemas.microsoft.com/office/powerpoint/2010/main" val="580966386"/>
-      </p:ext>
-    </p:extLst>
-  </p:cSld>
-  <p:clrMapOvr>
-    <a:masterClrMapping/>
-  </p:clrMapOvr>
-</p:sld>
-</file>
-
-<file path=ppt/slides/slide4.xml><?xml version="1.0" encoding="utf-8"?>
-<p:sld xmlns:a="http://schemas.openxmlformats.org/drawingml/2006/main" xmlns:r="http://schemas.openxmlformats.org/officeDocument/2006/relationships" xmlns:p="http://schemas.openxmlformats.org/presentationml/2006/main">
-  <p:cSld>
-    <p:spTree>
-      <p:nvGrpSpPr>
-        <p:cNvPr id="1" name=""/>
-        <p:cNvGrpSpPr/>
-        <p:nvPr/>
-      </p:nvGrpSpPr>
-      <p:grpSpPr>
-        <a:xfrm>
-          <a:off x="0" y="0"/>
-          <a:ext cx="0" cy="0"/>
-          <a:chOff x="0" y="0"/>
-          <a:chExt cx="0" cy="0"/>
-        </a:xfrm>
-      </p:grpSpPr>
-      <p:pic>
-        <p:nvPicPr>
-          <p:cNvPr id="1027" name="Picture 3"/>
-          <p:cNvPicPr>
-            <a:picLocks noChangeAspect="1" noChangeArrowheads="1"/>
-          </p:cNvPicPr>
-          <p:nvPr/>
-        </p:nvPicPr>
-        <p:blipFill>
-          <a:blip r:embed="rId3">
-            <a:extLst>
-              <a:ext uri="{28A0092B-C50C-407E-A947-70E740481C1C}">
-                <a14:useLocalDpi xmlns:a14="http://schemas.microsoft.com/office/drawing/2010/main" val="0"/>
-              </a:ext>
-            </a:extLst>
-          </a:blip>
-          <a:srcRect/>
-          <a:stretch>
-            <a:fillRect/>
-          </a:stretch>
-        </p:blipFill>
-        <p:spPr bwMode="auto">
-          <a:xfrm rot="368572">
-            <a:off x="-393872" y="1831500"/>
-            <a:ext cx="3124200" cy="4199632"/>
-          </a:xfrm>
-          <a:prstGeom prst="rect">
-            <a:avLst/>
-          </a:prstGeom>
-          <a:solidFill>
-            <a:srgbClr val="FFFFFF">
-              <a:shade val="85000"/>
-            </a:srgbClr>
-          </a:solidFill>
-          <a:ln w="88900" cap="sq">
-            <a:solidFill>
-              <a:srgbClr val="FFFFFF"/>
-            </a:solidFill>
-            <a:miter lim="800000"/>
-          </a:ln>
-          <a:effectLst>
-            <a:outerShdw blurRad="55000" dist="18000" dir="5400000" algn="tl" rotWithShape="0">
-              <a:srgbClr val="000000">
-                <a:alpha val="40000"/>
-              </a:srgbClr>
-            </a:outerShdw>
-          </a:effectLst>
-          <a:scene3d>
-            <a:camera prst="orthographicFront"/>
-            <a:lightRig rig="twoPt" dir="t">
-              <a:rot lat="0" lon="0" rev="7200000"/>
-            </a:lightRig>
-          </a:scene3d>
-          <a:sp3d>
-            <a:bevelT w="25400" h="19050"/>
-            <a:contourClr>
-              <a:srgbClr val="FFFFFF"/>
-            </a:contourClr>
-          </a:sp3d>
-          <a:extLst/>
-        </p:spPr>
-      </p:pic>
-      <p:pic>
-        <p:nvPicPr>
-          <p:cNvPr id="1028" name="Picture 4"/>
-          <p:cNvPicPr>
-            <a:picLocks noChangeAspect="1" noChangeArrowheads="1"/>
-          </p:cNvPicPr>
-          <p:nvPr/>
-        </p:nvPicPr>
-        <p:blipFill>
-          <a:blip r:embed="rId4">
-            <a:extLst>
-              <a:ext uri="{28A0092B-C50C-407E-A947-70E740481C1C}">
-                <a14:useLocalDpi xmlns:a14="http://schemas.microsoft.com/office/drawing/2010/main" val="0"/>
-              </a:ext>
-            </a:extLst>
-          </a:blip>
-          <a:srcRect/>
-          <a:stretch>
-            <a:fillRect/>
-          </a:stretch>
-        </p:blipFill>
-        <p:spPr bwMode="auto">
-          <a:xfrm rot="711747">
-            <a:off x="1022007" y="2728488"/>
-            <a:ext cx="3027589" cy="2228096"/>
-          </a:xfrm>
-          <a:prstGeom prst="rect">
-            <a:avLst/>
-          </a:prstGeom>
-          <a:solidFill>
-            <a:srgbClr val="FFFFFF">
-              <a:shade val="85000"/>
-            </a:srgbClr>
-          </a:solidFill>
-          <a:ln w="88900" cap="sq">
-            <a:solidFill>
-              <a:srgbClr val="FFFFFF"/>
-            </a:solidFill>
-            <a:miter lim="800000"/>
-          </a:ln>
-          <a:effectLst>
-            <a:outerShdw blurRad="55000" dist="18000" dir="5400000" algn="tl" rotWithShape="0">
-              <a:srgbClr val="000000">
-                <a:alpha val="40000"/>
-              </a:srgbClr>
-            </a:outerShdw>
-          </a:effectLst>
-          <a:scene3d>
-            <a:camera prst="orthographicFront"/>
-            <a:lightRig rig="twoPt" dir="t">
-              <a:rot lat="0" lon="0" rev="7200000"/>
-            </a:lightRig>
-          </a:scene3d>
-          <a:sp3d>
-            <a:bevelT w="25400" h="19050"/>
-            <a:contourClr>
-              <a:srgbClr val="FFFFFF"/>
-            </a:contourClr>
-          </a:sp3d>
-          <a:extLst/>
-        </p:spPr>
-      </p:pic>
-      <p:pic>
-        <p:nvPicPr>
-          <p:cNvPr id="1029" name="Picture 5"/>
-          <p:cNvPicPr>
-            <a:picLocks noChangeAspect="1" noChangeArrowheads="1"/>
-          </p:cNvPicPr>
-          <p:nvPr/>
-        </p:nvPicPr>
-        <p:blipFill>
-          <a:blip r:embed="rId5">
-            <a:extLst>
-              <a:ext uri="{28A0092B-C50C-407E-A947-70E740481C1C}">
-                <a14:useLocalDpi xmlns:a14="http://schemas.microsoft.com/office/drawing/2010/main" val="0"/>
-              </a:ext>
-            </a:extLst>
-          </a:blip>
-          <a:srcRect/>
-          <a:stretch>
-            <a:fillRect/>
-          </a:stretch>
-        </p:blipFill>
-        <p:spPr bwMode="auto">
-          <a:xfrm>
-            <a:off x="4571206" y="914400"/>
-            <a:ext cx="5097463" cy="4743450"/>
-          </a:xfrm>
-          <a:prstGeom prst="rect">
-            <a:avLst/>
-          </a:prstGeom>
-          <a:noFill/>
-          <a:ln>
-            <a:noFill/>
-          </a:ln>
-          <a:effectLst/>
-          <a:extLst>
-            <a:ext uri="{909E8E84-426E-40DD-AFC4-6F175D3DCCD1}">
-              <a14:hiddenFill xmlns:a14="http://schemas.microsoft.com/office/drawing/2010/main">
-                <a:solidFill>
-                  <a:schemeClr val="accent1"/>
-                </a:solidFill>
-              </a14:hiddenFill>
-            </a:ext>
-            <a:ext uri="{91240B29-F687-4F45-9708-019B960494DF}">
-              <a14:hiddenLine xmlns:a14="http://schemas.microsoft.com/office/drawing/2010/main" w="9525">
-                <a:solidFill>
-                  <a:schemeClr val="tx1"/>
-                </a:solidFill>
-                <a:miter lim="800000"/>
-                <a:headEnd/>
-                <a:tailEnd/>
-              </a14:hiddenLine>
-            </a:ext>
-            <a:ext uri="{AF507438-7753-43E0-B8FC-AC1667EBCBE1}">
-              <a14:hiddenEffects xmlns:a14="http://schemas.microsoft.com/office/drawing/2010/main">
-                <a:effectLst>
-                  <a:outerShdw dist="35921" dir="2700000" algn="ctr" rotWithShape="0">
-                    <a:schemeClr val="bg2"/>
-                  </a:outerShdw>
-                </a:effectLst>
-              </a14:hiddenEffects>
-            </a:ext>
-          </a:extLst>
-        </p:spPr>
-      </p:pic>
-    </p:spTree>
-    <p:custDataLst>
-      <p:tags r:id="rId1"/>
-    </p:custDataLst>
-    <p:extLst>
-      <p:ext uri="{BB962C8B-B14F-4D97-AF65-F5344CB8AC3E}">
-        <p14:creationId xmlns:p14="http://schemas.microsoft.com/office/powerpoint/2010/main" val="2140840612"/>
-      </p:ext>
-    </p:extLst>
-  </p:cSld>
-  <p:clrMapOvr>
-    <a:masterClrMapping/>
-  </p:clrMapOvr>
-</p:sld>
-</file>
-
-<file path=ppt/slides/slide5.xml><?xml version="1.0" encoding="utf-8"?>
-<p:sld xmlns:a="http://schemas.openxmlformats.org/drawingml/2006/main" xmlns:r="http://schemas.openxmlformats.org/officeDocument/2006/relationships" xmlns:p="http://schemas.openxmlformats.org/presentationml/2006/main">
-  <p:cSld>
-    <p:spTree>
-      <p:nvGrpSpPr>
-        <p:cNvPr id="1" name=""/>
-        <p:cNvGrpSpPr/>
-        <p:nvPr/>
-      </p:nvGrpSpPr>
-      <p:grpSpPr>
-        <a:xfrm>
-          <a:off x="0" y="0"/>
-          <a:ext cx="0" cy="0"/>
-          <a:chOff x="0" y="0"/>
-          <a:chExt cx="0" cy="0"/>
-        </a:xfrm>
-      </p:grpSpPr>
-      <p:sp>
-        <p:nvSpPr>
-          <p:cNvPr id="2" name="TextBox 1"/>
-          <p:cNvSpPr txBox="1"/>
-          <p:nvPr/>
-        </p:nvSpPr>
-        <p:spPr>
-          <a:xfrm>
-            <a:off x="241300" y="1347607"/>
-            <a:ext cx="4800600" cy="646331"/>
-          </a:xfrm>
-          <a:prstGeom prst="rect">
-            <a:avLst/>
-          </a:prstGeom>
-          <a:noFill/>
-        </p:spPr>
-        <p:txBody>
-          <a:bodyPr wrap="square" rtlCol="0">
-            <a:spAutoFit/>
-          </a:bodyPr>
-          <a:lstStyle/>
-          <a:p>
-            <a:r>
-              <a:rPr lang="en-GB" dirty="0"/>
-              <a:t>Data for demonstration app kindly provided by </a:t>
-            </a:r>
-            <a:br>
-              <a:rPr lang="en-GB" dirty="0"/>
-            </a:br>
-            <a:r>
-              <a:rPr lang="en-GB" dirty="0" err="1"/>
-              <a:t>Dr.</a:t>
-            </a:r>
-            <a:r>
-              <a:rPr lang="en-GB" dirty="0"/>
-              <a:t> Evans O. </a:t>
-            </a:r>
-            <a:r>
-              <a:rPr lang="en-GB" dirty="0" err="1"/>
-              <a:t>Ouma</a:t>
-            </a:r>
-            <a:r>
-              <a:rPr lang="en-GB" dirty="0"/>
-              <a:t>, </a:t>
-            </a:r>
-            <a:r>
-              <a:rPr lang="en-GB" dirty="0" err="1"/>
-              <a:t>Rongo</a:t>
-            </a:r>
-            <a:r>
-              <a:rPr lang="en-GB" dirty="0"/>
-              <a:t> University College</a:t>
-            </a:r>
-          </a:p>
-        </p:txBody>
-      </p:sp>
-      <p:pic>
-        <p:nvPicPr>
-          <p:cNvPr id="3074" name="Picture 2" descr="http://192.168.0.75:8100/img/suppliers/Rongo%20University%20College.jpg"/>
-          <p:cNvPicPr>
-            <a:picLocks noChangeAspect="1" noChangeArrowheads="1"/>
-          </p:cNvPicPr>
-          <p:nvPr/>
-        </p:nvPicPr>
-        <p:blipFill>
-          <a:blip r:embed="rId3" cstate="print">
-            <a:clrChange>
-              <a:clrFrom>
-                <a:srgbClr val="FFFFFF"/>
-              </a:clrFrom>
-              <a:clrTo>
-                <a:srgbClr val="FFFFFF">
-                  <a:alpha val="0"/>
-                </a:srgbClr>
-              </a:clrTo>
-            </a:clrChange>
-            <a:extLst>
-              <a:ext uri="{28A0092B-C50C-407E-A947-70E740481C1C}">
-                <a14:useLocalDpi xmlns:a14="http://schemas.microsoft.com/office/drawing/2010/main" val="0"/>
-              </a:ext>
-            </a:extLst>
-          </a:blip>
-          <a:srcRect/>
-          <a:stretch>
-            <a:fillRect/>
-          </a:stretch>
-        </p:blipFill>
-        <p:spPr bwMode="auto">
-          <a:xfrm>
-            <a:off x="241300" y="606223"/>
-            <a:ext cx="2724150" cy="741384"/>
-          </a:xfrm>
-          <a:prstGeom prst="rect">
-            <a:avLst/>
-          </a:prstGeom>
-          <a:noFill/>
-          <a:extLst>
-            <a:ext uri="{909E8E84-426E-40DD-AFC4-6F175D3DCCD1}">
-              <a14:hiddenFill xmlns:a14="http://schemas.microsoft.com/office/drawing/2010/main">
-                <a:solidFill>
-                  <a:srgbClr val="FFFFFF"/>
-                </a:solidFill>
-              </a14:hiddenFill>
-            </a:ext>
-          </a:extLst>
-        </p:spPr>
-      </p:pic>
-      <p:sp>
-        <p:nvSpPr>
-          <p:cNvPr id="4" name="TextBox 3"/>
-          <p:cNvSpPr txBox="1"/>
-          <p:nvPr/>
-        </p:nvSpPr>
-        <p:spPr>
-          <a:xfrm>
-            <a:off x="228600" y="3180146"/>
-            <a:ext cx="4570213" cy="923330"/>
-          </a:xfrm>
-          <a:prstGeom prst="rect">
-            <a:avLst/>
-          </a:prstGeom>
-          <a:noFill/>
-        </p:spPr>
-        <p:txBody>
-          <a:bodyPr wrap="square" rtlCol="0">
-            <a:spAutoFit/>
-          </a:bodyPr>
-          <a:lstStyle/>
-          <a:p>
-            <a:r>
-              <a:rPr lang="en-GB" dirty="0"/>
-              <a:t>App developed by the Statistical Services Centre, University of Reading. Source code available on GitHub</a:t>
-            </a:r>
-          </a:p>
-        </p:txBody>
-      </p:sp>
-      <p:pic>
-        <p:nvPicPr>
-          <p:cNvPr id="3076" name="Picture 4" descr="http://www.reading.ac.uk/ssc/images/SscLogo.png"/>
-          <p:cNvPicPr>
-            <a:picLocks noChangeAspect="1" noChangeArrowheads="1"/>
-          </p:cNvPicPr>
-          <p:nvPr/>
-        </p:nvPicPr>
-        <p:blipFill>
-          <a:blip r:embed="rId4" cstate="print">
-            <a:extLst>
-              <a:ext uri="{28A0092B-C50C-407E-A947-70E740481C1C}">
-                <a14:useLocalDpi xmlns:a14="http://schemas.microsoft.com/office/drawing/2010/main" val="0"/>
-              </a:ext>
-            </a:extLst>
-          </a:blip>
-          <a:srcRect/>
-          <a:stretch>
-            <a:fillRect/>
-          </a:stretch>
-        </p:blipFill>
-        <p:spPr bwMode="auto">
-          <a:xfrm>
-            <a:off x="241300" y="2408774"/>
-            <a:ext cx="718475" cy="718475"/>
-          </a:xfrm>
-          <a:prstGeom prst="rect">
-            <a:avLst/>
-          </a:prstGeom>
-          <a:noFill/>
-          <a:extLst>
-            <a:ext uri="{909E8E84-426E-40DD-AFC4-6F175D3DCCD1}">
-              <a14:hiddenFill xmlns:a14="http://schemas.microsoft.com/office/drawing/2010/main">
-                <a:solidFill>
-                  <a:srgbClr val="FFFFFF"/>
-                </a:solidFill>
-              </a14:hiddenFill>
-            </a:ext>
-          </a:extLst>
-        </p:spPr>
-      </p:pic>
-      <p:pic>
-        <p:nvPicPr>
-          <p:cNvPr id="3078" name="Picture 6" descr="http://www.reading.ac.uk/ssc/images/UorLogo.png"/>
-          <p:cNvPicPr>
-            <a:picLocks noChangeAspect="1" noChangeArrowheads="1"/>
-          </p:cNvPicPr>
-          <p:nvPr/>
-        </p:nvPicPr>
-        <p:blipFill>
-          <a:blip r:embed="rId5">
-            <a:extLst>
-              <a:ext uri="{28A0092B-C50C-407E-A947-70E740481C1C}">
-                <a14:useLocalDpi xmlns:a14="http://schemas.microsoft.com/office/drawing/2010/main" val="0"/>
-              </a:ext>
-            </a:extLst>
-          </a:blip>
-          <a:srcRect/>
-          <a:stretch>
-            <a:fillRect/>
-          </a:stretch>
-        </p:blipFill>
-        <p:spPr bwMode="auto">
-          <a:xfrm>
-            <a:off x="1141213" y="2408775"/>
-            <a:ext cx="2171700" cy="786430"/>
-          </a:xfrm>
-          <a:prstGeom prst="rect">
-            <a:avLst/>
-          </a:prstGeom>
-          <a:noFill/>
-          <a:extLst>
-            <a:ext uri="{909E8E84-426E-40DD-AFC4-6F175D3DCCD1}">
-              <a14:hiddenFill xmlns:a14="http://schemas.microsoft.com/office/drawing/2010/main">
-                <a:solidFill>
-                  <a:srgbClr val="FFFFFF"/>
-                </a:solidFill>
-              </a14:hiddenFill>
-            </a:ext>
-          </a:extLst>
-        </p:spPr>
-      </p:pic>
-      <p:pic>
-        <p:nvPicPr>
-          <p:cNvPr id="3081" name="Picture 9"/>
-          <p:cNvPicPr>
-            <a:picLocks noChangeAspect="1" noChangeArrowheads="1"/>
-          </p:cNvPicPr>
-          <p:nvPr/>
-        </p:nvPicPr>
-        <p:blipFill>
-          <a:blip r:embed="rId6">
-            <a:extLst>
-              <a:ext uri="{28A0092B-C50C-407E-A947-70E740481C1C}">
-                <a14:useLocalDpi xmlns:a14="http://schemas.microsoft.com/office/drawing/2010/main" val="0"/>
-              </a:ext>
-            </a:extLst>
-          </a:blip>
-          <a:srcRect/>
-          <a:stretch>
-            <a:fillRect/>
-          </a:stretch>
-        </p:blipFill>
-        <p:spPr bwMode="auto">
-          <a:xfrm>
-            <a:off x="5334000" y="1519262"/>
-            <a:ext cx="5105400" cy="3767836"/>
-          </a:xfrm>
-          <a:prstGeom prst="rect">
-            <a:avLst/>
-          </a:prstGeom>
-          <a:solidFill>
-            <a:srgbClr val="FFFFFF">
-              <a:shade val="85000"/>
-            </a:srgbClr>
-          </a:solidFill>
-          <a:ln w="88900" cap="sq">
-            <a:solidFill>
-              <a:srgbClr val="FFFFFF"/>
-            </a:solidFill>
-            <a:miter lim="800000"/>
-          </a:ln>
-          <a:effectLst>
-            <a:outerShdw blurRad="55000" dist="18000" dir="5400000" algn="tl" rotWithShape="0">
-              <a:srgbClr val="000000">
-                <a:alpha val="40000"/>
-              </a:srgbClr>
-            </a:outerShdw>
-          </a:effectLst>
-          <a:scene3d>
-            <a:camera prst="orthographicFront"/>
-            <a:lightRig rig="twoPt" dir="t">
-              <a:rot lat="0" lon="0" rev="7200000"/>
-            </a:lightRig>
-          </a:scene3d>
-          <a:sp3d>
-            <a:bevelT w="25400" h="19050"/>
-            <a:contourClr>
-              <a:srgbClr val="FFFFFF"/>
-            </a:contourClr>
-          </a:sp3d>
-          <a:extLst/>
-        </p:spPr>
-      </p:pic>
-    </p:spTree>
-    <p:custDataLst>
-      <p:tags r:id="rId1"/>
-    </p:custDataLst>
-    <p:extLst>
-      <p:ext uri="{BB962C8B-B14F-4D97-AF65-F5344CB8AC3E}">
-        <p14:creationId xmlns:p14="http://schemas.microsoft.com/office/powerpoint/2010/main" val="1749249616"/>
-      </p:ext>
-    </p:extLst>
-  </p:cSld>
-  <p:clrMapOvr>
-    <a:masterClrMapping/>
-  </p:clrMapOvr>
-</p:sld>
-</file>
-
-<file path=ppt/slides/slide6.xml><?xml version="1.0" encoding="utf-8"?>
 <p:sld xmlns:a="http://schemas.openxmlformats.org/drawingml/2006/main" xmlns:r="http://schemas.openxmlformats.org/officeDocument/2006/relationships" xmlns:p="http://schemas.openxmlformats.org/presentationml/2006/main">
   <p:cSld>
     <p:spTree>
@@ -4693,7 +3966,7 @@
         </p:blipFill>
         <p:spPr bwMode="auto">
           <a:xfrm>
-            <a:off x="7772400" y="-1219200"/>
+            <a:off x="5829531" y="0"/>
             <a:ext cx="4694237" cy="4865687"/>
           </a:xfrm>
           <a:prstGeom prst="rect">
@@ -4741,6 +4014,1540 @@
     <p:extLst>
       <p:ext uri="{BB962C8B-B14F-4D97-AF65-F5344CB8AC3E}">
         <p14:creationId xmlns:p14="http://schemas.microsoft.com/office/powerpoint/2010/main" val="152169783"/>
+      </p:ext>
+    </p:extLst>
+  </p:cSld>
+  <p:clrMapOvr>
+    <a:masterClrMapping/>
+  </p:clrMapOvr>
+</p:sld>
+</file>
+
+<file path=ppt/slides/slide4.xml><?xml version="1.0" encoding="utf-8"?>
+<p:sld xmlns:a="http://schemas.openxmlformats.org/drawingml/2006/main" xmlns:r="http://schemas.openxmlformats.org/officeDocument/2006/relationships" xmlns:p="http://schemas.openxmlformats.org/presentationml/2006/main">
+  <p:cSld>
+    <p:spTree>
+      <p:nvGrpSpPr>
+        <p:cNvPr id="1" name=""/>
+        <p:cNvGrpSpPr/>
+        <p:nvPr/>
+      </p:nvGrpSpPr>
+      <p:grpSpPr>
+        <a:xfrm>
+          <a:off x="0" y="0"/>
+          <a:ext cx="0" cy="0"/>
+          <a:chOff x="0" y="0"/>
+          <a:chExt cx="0" cy="0"/>
+        </a:xfrm>
+      </p:grpSpPr>
+      <p:grpSp>
+        <p:nvGrpSpPr>
+          <p:cNvPr id="13" name="Group 12"/>
+          <p:cNvGrpSpPr/>
+          <p:nvPr/>
+        </p:nvGrpSpPr>
+        <p:grpSpPr>
+          <a:xfrm>
+            <a:off x="1143000" y="0"/>
+            <a:ext cx="6858000" cy="6858000"/>
+            <a:chOff x="1143000" y="0"/>
+            <a:chExt cx="6858000" cy="6858000"/>
+          </a:xfrm>
+        </p:grpSpPr>
+        <p:pic>
+          <p:nvPicPr>
+            <p:cNvPr id="2" name="Picture 1"/>
+            <p:cNvPicPr>
+              <a:picLocks noChangeAspect="1"/>
+            </p:cNvPicPr>
+            <p:nvPr/>
+          </p:nvPicPr>
+          <p:blipFill>
+            <a:blip r:embed="rId2" cstate="print">
+              <a:extLst>
+                <a:ext uri="{28A0092B-C50C-407E-A947-70E740481C1C}">
+                  <a14:useLocalDpi xmlns:a14="http://schemas.microsoft.com/office/drawing/2010/main" val="0"/>
+                </a:ext>
+              </a:extLst>
+            </a:blip>
+            <a:stretch>
+              <a:fillRect/>
+            </a:stretch>
+          </p:blipFill>
+          <p:spPr>
+            <a:xfrm>
+              <a:off x="1143000" y="0"/>
+              <a:ext cx="6858000" cy="6858000"/>
+            </a:xfrm>
+            <a:prstGeom prst="rect">
+              <a:avLst/>
+            </a:prstGeom>
+          </p:spPr>
+        </p:pic>
+        <p:grpSp>
+          <p:nvGrpSpPr>
+            <p:cNvPr id="3" name="Group 2"/>
+            <p:cNvGrpSpPr/>
+            <p:nvPr/>
+          </p:nvGrpSpPr>
+          <p:grpSpPr>
+            <a:xfrm>
+              <a:off x="2703187" y="2517384"/>
+              <a:ext cx="3737625" cy="1823232"/>
+              <a:chOff x="272400" y="1521046"/>
+              <a:chExt cx="7380000" cy="3600000"/>
+            </a:xfrm>
+          </p:grpSpPr>
+          <p:pic>
+            <p:nvPicPr>
+              <p:cNvPr id="4" name="Picture 3"/>
+              <p:cNvPicPr>
+                <a:picLocks noChangeAspect="1"/>
+              </p:cNvPicPr>
+              <p:nvPr/>
+            </p:nvPicPr>
+            <p:blipFill>
+              <a:blip r:embed="rId3"/>
+              <a:stretch>
+                <a:fillRect/>
+              </a:stretch>
+            </p:blipFill>
+            <p:spPr>
+              <a:xfrm rot="21062032">
+                <a:off x="5301477" y="1849887"/>
+                <a:ext cx="1705086" cy="3030769"/>
+              </a:xfrm>
+              <a:prstGeom prst="rect">
+                <a:avLst/>
+              </a:prstGeom>
+              <a:ln>
+                <a:solidFill>
+                  <a:schemeClr val="tx1"/>
+                </a:solidFill>
+              </a:ln>
+            </p:spPr>
+          </p:pic>
+          <p:pic>
+            <p:nvPicPr>
+              <p:cNvPr id="5" name="Picture 4"/>
+              <p:cNvPicPr>
+                <a:picLocks noChangeAspect="1"/>
+              </p:cNvPicPr>
+              <p:nvPr/>
+            </p:nvPicPr>
+            <p:blipFill>
+              <a:blip r:embed="rId4"/>
+              <a:stretch>
+                <a:fillRect/>
+              </a:stretch>
+            </p:blipFill>
+            <p:spPr>
+              <a:xfrm rot="501189">
+                <a:off x="982488" y="1772234"/>
+                <a:ext cx="1729284" cy="3044261"/>
+              </a:xfrm>
+              <a:prstGeom prst="rect">
+                <a:avLst/>
+              </a:prstGeom>
+              <a:ln>
+                <a:solidFill>
+                  <a:schemeClr val="tx1"/>
+                </a:solidFill>
+              </a:ln>
+            </p:spPr>
+          </p:pic>
+          <p:pic>
+            <p:nvPicPr>
+              <p:cNvPr id="6" name="Picture 5"/>
+              <p:cNvPicPr>
+                <a:picLocks noChangeAspect="1"/>
+              </p:cNvPicPr>
+              <p:nvPr/>
+            </p:nvPicPr>
+            <p:blipFill rotWithShape="1">
+              <a:blip r:embed="rId5"/>
+              <a:srcRect l="3679"/>
+              <a:stretch/>
+            </p:blipFill>
+            <p:spPr>
+              <a:xfrm rot="21294864">
+                <a:off x="2143478" y="1946197"/>
+                <a:ext cx="1590975" cy="2895864"/>
+              </a:xfrm>
+              <a:prstGeom prst="rect">
+                <a:avLst/>
+              </a:prstGeom>
+              <a:ln>
+                <a:solidFill>
+                  <a:schemeClr val="tx1"/>
+                </a:solidFill>
+              </a:ln>
+            </p:spPr>
+          </p:pic>
+          <p:pic>
+            <p:nvPicPr>
+              <p:cNvPr id="7" name="Picture 6"/>
+              <p:cNvPicPr>
+                <a:picLocks noChangeAspect="1"/>
+              </p:cNvPicPr>
+              <p:nvPr/>
+            </p:nvPicPr>
+            <p:blipFill>
+              <a:blip r:embed="rId6"/>
+              <a:stretch>
+                <a:fillRect/>
+              </a:stretch>
+            </p:blipFill>
+            <p:spPr>
+              <a:xfrm rot="517990">
+                <a:off x="4078348" y="1803822"/>
+                <a:ext cx="1764157" cy="3046770"/>
+              </a:xfrm>
+              <a:prstGeom prst="rect">
+                <a:avLst/>
+              </a:prstGeom>
+              <a:ln>
+                <a:solidFill>
+                  <a:schemeClr val="tx1"/>
+                </a:solidFill>
+              </a:ln>
+            </p:spPr>
+          </p:pic>
+          <p:pic>
+            <p:nvPicPr>
+              <p:cNvPr id="8" name="Picture 7"/>
+              <p:cNvPicPr>
+                <a:picLocks noChangeAspect="1"/>
+              </p:cNvPicPr>
+              <p:nvPr/>
+            </p:nvPicPr>
+            <p:blipFill>
+              <a:blip r:embed="rId7"/>
+              <a:stretch>
+                <a:fillRect/>
+              </a:stretch>
+            </p:blipFill>
+            <p:spPr>
+              <a:xfrm rot="190812">
+                <a:off x="2863881" y="1849888"/>
+                <a:ext cx="1717288" cy="3030769"/>
+              </a:xfrm>
+              <a:prstGeom prst="rect">
+                <a:avLst/>
+              </a:prstGeom>
+              <a:ln>
+                <a:solidFill>
+                  <a:schemeClr val="tx1"/>
+                </a:solidFill>
+              </a:ln>
+            </p:spPr>
+          </p:pic>
+          <p:sp>
+            <p:nvSpPr>
+              <p:cNvPr id="9" name="Rectangle 8"/>
+              <p:cNvSpPr/>
+              <p:nvPr/>
+            </p:nvSpPr>
+            <p:spPr>
+              <a:xfrm>
+                <a:off x="272400" y="1521046"/>
+                <a:ext cx="7380000" cy="3600000"/>
+              </a:xfrm>
+              <a:prstGeom prst="rect">
+                <a:avLst/>
+              </a:prstGeom>
+              <a:noFill/>
+              <a:ln>
+                <a:solidFill>
+                  <a:schemeClr val="bg1"/>
+                </a:solidFill>
+              </a:ln>
+            </p:spPr>
+            <p:style>
+              <a:lnRef idx="2">
+                <a:schemeClr val="dk1"/>
+              </a:lnRef>
+              <a:fillRef idx="1">
+                <a:schemeClr val="lt1"/>
+              </a:fillRef>
+              <a:effectRef idx="0">
+                <a:schemeClr val="dk1"/>
+              </a:effectRef>
+              <a:fontRef idx="minor">
+                <a:schemeClr val="dk1"/>
+              </a:fontRef>
+            </p:style>
+            <p:txBody>
+              <a:bodyPr rtlCol="0" anchor="ctr"/>
+              <a:lstStyle/>
+              <a:p>
+                <a:pPr algn="ctr"/>
+                <a:r>
+                  <a:rPr lang="en-GB" dirty="0"/>
+                  <a:t>.</a:t>
+                </a:r>
+              </a:p>
+              <a:p>
+                <a:pPr algn="ctr"/>
+                <a:endParaRPr lang="en-GB" dirty="0"/>
+              </a:p>
+            </p:txBody>
+          </p:sp>
+        </p:grpSp>
+        <p:sp>
+          <p:nvSpPr>
+            <p:cNvPr id="10" name="TextBox 9"/>
+            <p:cNvSpPr txBox="1"/>
+            <p:nvPr/>
+          </p:nvSpPr>
+          <p:spPr>
+            <a:xfrm>
+              <a:off x="2955468" y="1676400"/>
+              <a:ext cx="3272592" cy="707886"/>
+            </a:xfrm>
+            <a:prstGeom prst="rect">
+              <a:avLst/>
+            </a:prstGeom>
+            <a:noFill/>
+          </p:spPr>
+          <p:txBody>
+            <a:bodyPr wrap="square" rtlCol="0">
+              <a:spAutoFit/>
+            </a:bodyPr>
+            <a:lstStyle/>
+            <a:p>
+              <a:pPr algn="ctr"/>
+              <a:r>
+                <a:rPr lang="en-GB" sz="2000" b="1" dirty="0"/>
+                <a:t>Sorghum Variety Catalogue</a:t>
+              </a:r>
+              <a:br>
+                <a:rPr lang="en-GB" sz="2000" dirty="0"/>
+              </a:br>
+              <a:r>
+                <a:rPr lang="en-GB" sz="2000" dirty="0"/>
+                <a:t>Kenya</a:t>
+              </a:r>
+            </a:p>
+          </p:txBody>
+        </p:sp>
+        <p:pic>
+          <p:nvPicPr>
+            <p:cNvPr id="11" name="Picture 2" descr="http://192.168.0.75:8100/img/suppliers/Rongo%20University%20College.jpg"/>
+            <p:cNvPicPr>
+              <a:picLocks noChangeAspect="1" noChangeArrowheads="1"/>
+            </p:cNvPicPr>
+            <p:nvPr/>
+          </p:nvPicPr>
+          <p:blipFill>
+            <a:blip r:embed="rId8" cstate="print">
+              <a:clrChange>
+                <a:clrFrom>
+                  <a:srgbClr val="FFFFFF"/>
+                </a:clrFrom>
+                <a:clrTo>
+                  <a:srgbClr val="FFFFFF">
+                    <a:alpha val="0"/>
+                  </a:srgbClr>
+                </a:clrTo>
+              </a:clrChange>
+              <a:extLst>
+                <a:ext uri="{28A0092B-C50C-407E-A947-70E740481C1C}">
+                  <a14:useLocalDpi xmlns:a14="http://schemas.microsoft.com/office/drawing/2010/main" val="0"/>
+                </a:ext>
+              </a:extLst>
+            </a:blip>
+            <a:srcRect/>
+            <a:stretch>
+              <a:fillRect/>
+            </a:stretch>
+          </p:blipFill>
+          <p:spPr bwMode="auto">
+            <a:xfrm>
+              <a:off x="3048000" y="4419097"/>
+              <a:ext cx="1375468" cy="374337"/>
+            </a:xfrm>
+            <a:prstGeom prst="rect">
+              <a:avLst/>
+            </a:prstGeom>
+            <a:noFill/>
+            <a:extLst>
+              <a:ext uri="{909E8E84-426E-40DD-AFC4-6F175D3DCCD1}">
+                <a14:hiddenFill xmlns:a14="http://schemas.microsoft.com/office/drawing/2010/main">
+                  <a:solidFill>
+                    <a:srgbClr val="FFFFFF"/>
+                  </a:solidFill>
+                </a14:hiddenFill>
+              </a:ext>
+            </a:extLst>
+          </p:spPr>
+        </p:pic>
+        <p:pic>
+          <p:nvPicPr>
+            <p:cNvPr id="12" name="Picture 11"/>
+            <p:cNvPicPr>
+              <a:picLocks noChangeAspect="1"/>
+            </p:cNvPicPr>
+            <p:nvPr/>
+          </p:nvPicPr>
+          <p:blipFill>
+            <a:blip r:embed="rId9" cstate="print">
+              <a:extLst>
+                <a:ext uri="{28A0092B-C50C-407E-A947-70E740481C1C}">
+                  <a14:useLocalDpi xmlns:a14="http://schemas.microsoft.com/office/drawing/2010/main" val="0"/>
+                </a:ext>
+              </a:extLst>
+            </a:blip>
+            <a:stretch>
+              <a:fillRect/>
+            </a:stretch>
+          </p:blipFill>
+          <p:spPr>
+            <a:xfrm>
+              <a:off x="4455219" y="4419097"/>
+              <a:ext cx="1488382" cy="350569"/>
+            </a:xfrm>
+            <a:prstGeom prst="rect">
+              <a:avLst/>
+            </a:prstGeom>
+          </p:spPr>
+        </p:pic>
+      </p:grpSp>
+    </p:spTree>
+    <p:extLst>
+      <p:ext uri="{BB962C8B-B14F-4D97-AF65-F5344CB8AC3E}">
+        <p14:creationId xmlns:p14="http://schemas.microsoft.com/office/powerpoint/2010/main" val="1709396146"/>
+      </p:ext>
+    </p:extLst>
+  </p:cSld>
+  <p:clrMapOvr>
+    <a:masterClrMapping/>
+  </p:clrMapOvr>
+</p:sld>
+</file>
+
+<file path=ppt/slides/slide5.xml><?xml version="1.0" encoding="utf-8"?>
+<p:sld xmlns:a="http://schemas.openxmlformats.org/drawingml/2006/main" xmlns:r="http://schemas.openxmlformats.org/officeDocument/2006/relationships" xmlns:p="http://schemas.openxmlformats.org/presentationml/2006/main">
+  <p:cSld>
+    <p:bg>
+      <p:bgPr>
+        <a:solidFill>
+          <a:schemeClr val="tx2">
+            <a:lumMod val="20000"/>
+            <a:lumOff val="80000"/>
+          </a:schemeClr>
+        </a:solidFill>
+        <a:effectLst/>
+      </p:bgPr>
+    </p:bg>
+    <p:spTree>
+      <p:nvGrpSpPr>
+        <p:cNvPr id="1" name=""/>
+        <p:cNvGrpSpPr/>
+        <p:nvPr/>
+      </p:nvGrpSpPr>
+      <p:grpSpPr>
+        <a:xfrm>
+          <a:off x="0" y="0"/>
+          <a:ext cx="0" cy="0"/>
+          <a:chOff x="0" y="0"/>
+          <a:chExt cx="0" cy="0"/>
+        </a:xfrm>
+      </p:grpSpPr>
+      <p:pic>
+        <p:nvPicPr>
+          <p:cNvPr id="1026" name="Picture 2"/>
+          <p:cNvPicPr>
+            <a:picLocks noChangeAspect="1" noChangeArrowheads="1"/>
+          </p:cNvPicPr>
+          <p:nvPr/>
+        </p:nvPicPr>
+        <p:blipFill rotWithShape="1">
+          <a:blip r:embed="rId3">
+            <a:extLst>
+              <a:ext uri="{BEBA8EAE-BF5A-486C-A8C5-ECC9F3942E4B}">
+                <a14:imgProps xmlns:a14="http://schemas.microsoft.com/office/drawing/2010/main">
+                  <a14:imgLayer r:embed="rId4">
+                    <a14:imgEffect>
+                      <a14:backgroundRemoval t="0" b="100000" l="0" r="100000">
+                        <a14:foregroundMark x1="4532" y1="93030" x2="74622" y2="23636"/>
+                        <a14:foregroundMark x1="20544" y1="19394" x2="38973" y2="7273"/>
+                        <a14:foregroundMark x1="49547" y1="4848" x2="49547" y2="4848"/>
+                        <a14:foregroundMark x1="51057" y1="3030" x2="51057" y2="3030"/>
+                        <a14:foregroundMark x1="54079" y1="4242" x2="81269" y2="29091"/>
+                        <a14:foregroundMark x1="82477" y1="33030" x2="12689" y2="32121"/>
+                        <a14:foregroundMark x1="37160" y1="12121" x2="67674" y2="64545"/>
+                      </a14:backgroundRemoval>
+                    </a14:imgEffect>
+                  </a14:imgLayer>
+                </a14:imgProps>
+              </a:ext>
+              <a:ext uri="{28A0092B-C50C-407E-A947-70E740481C1C}">
+                <a14:useLocalDpi xmlns:a14="http://schemas.microsoft.com/office/drawing/2010/main" val="0"/>
+              </a:ext>
+            </a:extLst>
+          </a:blip>
+          <a:srcRect l="151" r="151"/>
+          <a:stretch/>
+        </p:blipFill>
+        <p:spPr bwMode="auto">
+          <a:xfrm>
+            <a:off x="685800" y="609600"/>
+            <a:ext cx="1800000" cy="1800000"/>
+          </a:xfrm>
+          <a:prstGeom prst="rect">
+            <a:avLst/>
+          </a:prstGeom>
+          <a:noFill/>
+          <a:ln>
+            <a:noFill/>
+          </a:ln>
+          <a:extLst>
+            <a:ext uri="{909E8E84-426E-40DD-AFC4-6F175D3DCCD1}">
+              <a14:hiddenFill xmlns:a14="http://schemas.microsoft.com/office/drawing/2010/main">
+                <a:solidFill>
+                  <a:schemeClr val="accent1"/>
+                </a:solidFill>
+              </a14:hiddenFill>
+            </a:ext>
+            <a:ext uri="{91240B29-F687-4F45-9708-019B960494DF}">
+              <a14:hiddenLine xmlns:a14="http://schemas.microsoft.com/office/drawing/2010/main" w="9525">
+                <a:solidFill>
+                  <a:schemeClr val="tx1"/>
+                </a:solidFill>
+                <a:miter lim="800000"/>
+                <a:headEnd/>
+                <a:tailEnd/>
+              </a14:hiddenLine>
+            </a:ext>
+          </a:extLst>
+        </p:spPr>
+      </p:pic>
+      <p:pic>
+        <p:nvPicPr>
+          <p:cNvPr id="1027" name="Picture 3"/>
+          <p:cNvPicPr>
+            <a:picLocks noChangeAspect="1" noChangeArrowheads="1"/>
+          </p:cNvPicPr>
+          <p:nvPr/>
+        </p:nvPicPr>
+        <p:blipFill rotWithShape="1">
+          <a:blip r:embed="rId5">
+            <a:extLst>
+              <a:ext uri="{BEBA8EAE-BF5A-486C-A8C5-ECC9F3942E4B}">
+                <a14:imgProps xmlns:a14="http://schemas.microsoft.com/office/drawing/2010/main">
+                  <a14:imgLayer r:embed="rId6">
+                    <a14:imgEffect>
+                      <a14:backgroundRemoval t="0" b="100000" l="0" r="100000">
+                        <a14:foregroundMark x1="5714" y1="5882" x2="87143" y2="95588"/>
+                        <a14:foregroundMark x1="10952" y1="95588" x2="86667" y2="8824"/>
+                        <a14:foregroundMark x1="64286" y1="8824" x2="85714" y2="72059"/>
+                        <a14:foregroundMark x1="52381" y1="89216" x2="83333" y2="35294"/>
+                        <a14:foregroundMark x1="37143" y1="87255" x2="20476" y2="38725"/>
+                        <a14:foregroundMark x1="3810" y1="62745" x2="3810" y2="62745"/>
+                        <a14:foregroundMark x1="4286" y1="56373" x2="4286" y2="46078"/>
+                        <a14:foregroundMark x1="3333" y1="42157" x2="3333" y2="42157"/>
+                        <a14:foregroundMark x1="3810" y1="4412" x2="3810" y2="4412"/>
+                        <a14:foregroundMark x1="3810" y1="4902" x2="3810" y2="47549"/>
+                        <a14:foregroundMark x1="3333" y1="3922" x2="84762" y2="3431"/>
+                        <a14:foregroundMark x1="86190" y1="3922" x2="95714" y2="3922"/>
+                        <a14:foregroundMark x1="95714" y1="3922" x2="95714" y2="98039"/>
+                        <a14:foregroundMark x1="95238" y1="97549" x2="3810" y2="96078"/>
+                        <a14:foregroundMark x1="3810" y1="96078" x2="3810" y2="57843"/>
+                        <a14:foregroundMark x1="5714" y1="57353" x2="87619" y2="86765"/>
+                        <a14:foregroundMark x1="23810" y1="91667" x2="71905" y2="60294"/>
+                        <a14:foregroundMark x1="84762" y1="86275" x2="75714" y2="16176"/>
+                        <a14:foregroundMark x1="97143" y1="24510" x2="96190" y2="73039"/>
+                        <a14:foregroundMark x1="47619" y1="42647" x2="30476" y2="18627"/>
+                        <a14:backgroundMark x1="2381" y1="1471" x2="96667" y2="980"/>
+                        <a14:backgroundMark x1="99048" y1="14706" x2="98571" y2="99020"/>
+                        <a14:backgroundMark x1="4286" y1="99510" x2="84762" y2="99510"/>
+                      </a14:backgroundRemoval>
+                    </a14:imgEffect>
+                  </a14:imgLayer>
+                </a14:imgProps>
+              </a:ext>
+              <a:ext uri="{28A0092B-C50C-407E-A947-70E740481C1C}">
+                <a14:useLocalDpi xmlns:a14="http://schemas.microsoft.com/office/drawing/2010/main" val="0"/>
+              </a:ext>
+            </a:extLst>
+          </a:blip>
+          <a:srcRect l="1428" r="1428"/>
+          <a:stretch/>
+        </p:blipFill>
+        <p:spPr bwMode="auto">
+          <a:xfrm>
+            <a:off x="2711548" y="609600"/>
+            <a:ext cx="1800000" cy="1800000"/>
+          </a:xfrm>
+          <a:prstGeom prst="rect">
+            <a:avLst/>
+          </a:prstGeom>
+          <a:noFill/>
+          <a:ln>
+            <a:noFill/>
+          </a:ln>
+          <a:extLst>
+            <a:ext uri="{909E8E84-426E-40DD-AFC4-6F175D3DCCD1}">
+              <a14:hiddenFill xmlns:a14="http://schemas.microsoft.com/office/drawing/2010/main">
+                <a:solidFill>
+                  <a:schemeClr val="accent1"/>
+                </a:solidFill>
+              </a14:hiddenFill>
+            </a:ext>
+            <a:ext uri="{91240B29-F687-4F45-9708-019B960494DF}">
+              <a14:hiddenLine xmlns:a14="http://schemas.microsoft.com/office/drawing/2010/main" w="9525">
+                <a:solidFill>
+                  <a:schemeClr val="tx1"/>
+                </a:solidFill>
+                <a:miter lim="800000"/>
+                <a:headEnd/>
+                <a:tailEnd/>
+              </a14:hiddenLine>
+            </a:ext>
+          </a:extLst>
+        </p:spPr>
+      </p:pic>
+      <p:pic>
+        <p:nvPicPr>
+          <p:cNvPr id="2050" name="Picture 2"/>
+          <p:cNvPicPr>
+            <a:picLocks noChangeAspect="1" noChangeArrowheads="1"/>
+          </p:cNvPicPr>
+          <p:nvPr/>
+        </p:nvPicPr>
+        <p:blipFill rotWithShape="1">
+          <a:blip r:embed="rId7">
+            <a:extLst>
+              <a:ext uri="{28A0092B-C50C-407E-A947-70E740481C1C}">
+                <a14:useLocalDpi xmlns:a14="http://schemas.microsoft.com/office/drawing/2010/main" val="0"/>
+              </a:ext>
+            </a:extLst>
+          </a:blip>
+          <a:srcRect l="679" t="-42640" r="-251" b="-44391"/>
+          <a:stretch/>
+        </p:blipFill>
+        <p:spPr bwMode="auto">
+          <a:xfrm>
+            <a:off x="4737296" y="601744"/>
+            <a:ext cx="1800000" cy="1800000"/>
+          </a:xfrm>
+          <a:prstGeom prst="rect">
+            <a:avLst/>
+          </a:prstGeom>
+          <a:noFill/>
+          <a:ln>
+            <a:noFill/>
+          </a:ln>
+          <a:extLst>
+            <a:ext uri="{909E8E84-426E-40DD-AFC4-6F175D3DCCD1}">
+              <a14:hiddenFill xmlns:a14="http://schemas.microsoft.com/office/drawing/2010/main">
+                <a:solidFill>
+                  <a:schemeClr val="accent1"/>
+                </a:solidFill>
+              </a14:hiddenFill>
+            </a:ext>
+            <a:ext uri="{91240B29-F687-4F45-9708-019B960494DF}">
+              <a14:hiddenLine xmlns:a14="http://schemas.microsoft.com/office/drawing/2010/main" w="9525">
+                <a:solidFill>
+                  <a:schemeClr val="tx1"/>
+                </a:solidFill>
+                <a:miter lim="800000"/>
+                <a:headEnd/>
+                <a:tailEnd/>
+              </a14:hiddenLine>
+            </a:ext>
+          </a:extLst>
+        </p:spPr>
+      </p:pic>
+      <p:pic>
+        <p:nvPicPr>
+          <p:cNvPr id="2" name="Picture 1"/>
+          <p:cNvPicPr>
+            <a:picLocks noChangeAspect="1"/>
+          </p:cNvPicPr>
+          <p:nvPr/>
+        </p:nvPicPr>
+        <p:blipFill rotWithShape="1">
+          <a:blip r:embed="rId8">
+            <a:clrChange>
+              <a:clrFrom>
+                <a:srgbClr val="FFFFFF"/>
+              </a:clrFrom>
+              <a:clrTo>
+                <a:srgbClr val="FFFFFF">
+                  <a:alpha val="0"/>
+                </a:srgbClr>
+              </a:clrTo>
+            </a:clrChange>
+          </a:blip>
+          <a:srcRect l="22242" t="11576" r="20918" b="18181"/>
+          <a:stretch/>
+        </p:blipFill>
+        <p:spPr>
+          <a:xfrm>
+            <a:off x="665375" y="2743200"/>
+            <a:ext cx="1800000" cy="1800000"/>
+          </a:xfrm>
+          <a:prstGeom prst="rect">
+            <a:avLst/>
+          </a:prstGeom>
+        </p:spPr>
+      </p:pic>
+      <p:pic>
+        <p:nvPicPr>
+          <p:cNvPr id="3" name="Picture 2"/>
+          <p:cNvPicPr>
+            <a:picLocks noChangeAspect="1"/>
+          </p:cNvPicPr>
+          <p:nvPr/>
+        </p:nvPicPr>
+        <p:blipFill>
+          <a:blip r:embed="rId9"/>
+          <a:stretch>
+            <a:fillRect/>
+          </a:stretch>
+        </p:blipFill>
+        <p:spPr>
+          <a:xfrm>
+            <a:off x="7556692" y="5638800"/>
+            <a:ext cx="1025333" cy="1019175"/>
+          </a:xfrm>
+          <a:prstGeom prst="rect">
+            <a:avLst/>
+          </a:prstGeom>
+        </p:spPr>
+      </p:pic>
+      <p:pic>
+        <p:nvPicPr>
+          <p:cNvPr id="4" name="Picture 3"/>
+          <p:cNvPicPr>
+            <a:picLocks noChangeAspect="1"/>
+          </p:cNvPicPr>
+          <p:nvPr/>
+        </p:nvPicPr>
+        <p:blipFill>
+          <a:blip r:embed="rId10"/>
+          <a:stretch>
+            <a:fillRect/>
+          </a:stretch>
+        </p:blipFill>
+        <p:spPr>
+          <a:xfrm>
+            <a:off x="6248400" y="5616019"/>
+            <a:ext cx="1068304" cy="1068304"/>
+          </a:xfrm>
+          <a:prstGeom prst="rect">
+            <a:avLst/>
+          </a:prstGeom>
+        </p:spPr>
+      </p:pic>
+      <p:pic>
+        <p:nvPicPr>
+          <p:cNvPr id="6" name="Picture 5"/>
+          <p:cNvPicPr>
+            <a:picLocks noChangeAspect="1"/>
+          </p:cNvPicPr>
+          <p:nvPr/>
+        </p:nvPicPr>
+        <p:blipFill rotWithShape="1">
+          <a:blip r:embed="rId11">
+            <a:clrChange>
+              <a:clrFrom>
+                <a:srgbClr val="FFFFFF"/>
+              </a:clrFrom>
+              <a:clrTo>
+                <a:srgbClr val="FFFFFF">
+                  <a:alpha val="0"/>
+                </a:srgbClr>
+              </a:clrTo>
+            </a:clrChange>
+          </a:blip>
+          <a:srcRect l="14667" t="12878" r="12878" b="14667"/>
+          <a:stretch/>
+        </p:blipFill>
+        <p:spPr>
+          <a:xfrm>
+            <a:off x="3048000" y="2780907"/>
+            <a:ext cx="1800000" cy="1800000"/>
+          </a:xfrm>
+          <a:prstGeom prst="rect">
+            <a:avLst/>
+          </a:prstGeom>
+        </p:spPr>
+      </p:pic>
+    </p:spTree>
+    <p:custDataLst>
+      <p:tags r:id="rId1"/>
+    </p:custDataLst>
+    <p:extLst>
+      <p:ext uri="{BB962C8B-B14F-4D97-AF65-F5344CB8AC3E}">
+        <p14:creationId xmlns:p14="http://schemas.microsoft.com/office/powerpoint/2010/main" val="986498556"/>
+      </p:ext>
+    </p:extLst>
+  </p:cSld>
+  <p:clrMapOvr>
+    <a:masterClrMapping/>
+  </p:clrMapOvr>
+</p:sld>
+</file>
+
+<file path=ppt/slides/slide6.xml><?xml version="1.0" encoding="utf-8"?>
+<p:sld xmlns:a="http://schemas.openxmlformats.org/drawingml/2006/main" xmlns:r="http://schemas.openxmlformats.org/officeDocument/2006/relationships" xmlns:p="http://schemas.openxmlformats.org/presentationml/2006/main">
+  <p:cSld>
+    <p:spTree>
+      <p:nvGrpSpPr>
+        <p:cNvPr id="1" name=""/>
+        <p:cNvGrpSpPr/>
+        <p:nvPr/>
+      </p:nvGrpSpPr>
+      <p:grpSpPr>
+        <a:xfrm>
+          <a:off x="0" y="0"/>
+          <a:ext cx="0" cy="0"/>
+          <a:chOff x="0" y="0"/>
+          <a:chExt cx="0" cy="0"/>
+        </a:xfrm>
+      </p:grpSpPr>
+      <p:pic>
+        <p:nvPicPr>
+          <p:cNvPr id="1026" name="Picture 2" descr="http://vignette3.wikia.nocookie.net/wiisportsresortwalkthrough/images/6/60/No_Image_Available.png/revision/latest?cb=20140118173446"/>
+          <p:cNvPicPr>
+            <a:picLocks noChangeAspect="1" noChangeArrowheads="1"/>
+          </p:cNvPicPr>
+          <p:nvPr/>
+        </p:nvPicPr>
+        <p:blipFill>
+          <a:blip r:embed="rId3">
+            <a:extLst>
+              <a:ext uri="{28A0092B-C50C-407E-A947-70E740481C1C}">
+                <a14:useLocalDpi xmlns:a14="http://schemas.microsoft.com/office/drawing/2010/main" val="0"/>
+              </a:ext>
+            </a:extLst>
+          </a:blip>
+          <a:srcRect/>
+          <a:stretch>
+            <a:fillRect/>
+          </a:stretch>
+        </p:blipFill>
+        <p:spPr bwMode="auto">
+          <a:xfrm>
+            <a:off x="2895600" y="533400"/>
+            <a:ext cx="4876800" cy="4876801"/>
+          </a:xfrm>
+          <a:prstGeom prst="rect">
+            <a:avLst/>
+          </a:prstGeom>
+          <a:noFill/>
+          <a:extLst>
+            <a:ext uri="{909E8E84-426E-40DD-AFC4-6F175D3DCCD1}">
+              <a14:hiddenFill xmlns:a14="http://schemas.microsoft.com/office/drawing/2010/main">
+                <a:solidFill>
+                  <a:srgbClr val="FFFFFF"/>
+                </a:solidFill>
+              </a14:hiddenFill>
+            </a:ext>
+          </a:extLst>
+        </p:spPr>
+      </p:pic>
+    </p:spTree>
+    <p:custDataLst>
+      <p:tags r:id="rId1"/>
+    </p:custDataLst>
+    <p:extLst>
+      <p:ext uri="{BB962C8B-B14F-4D97-AF65-F5344CB8AC3E}">
+        <p14:creationId xmlns:p14="http://schemas.microsoft.com/office/powerpoint/2010/main" val="3792651508"/>
+      </p:ext>
+    </p:extLst>
+  </p:cSld>
+  <p:clrMapOvr>
+    <a:masterClrMapping/>
+  </p:clrMapOvr>
+</p:sld>
+</file>
+
+<file path=ppt/slides/slide7.xml><?xml version="1.0" encoding="utf-8"?>
+<p:sld xmlns:a="http://schemas.openxmlformats.org/drawingml/2006/main" xmlns:r="http://schemas.openxmlformats.org/officeDocument/2006/relationships" xmlns:p="http://schemas.openxmlformats.org/presentationml/2006/main">
+  <p:cSld>
+    <p:spTree>
+      <p:nvGrpSpPr>
+        <p:cNvPr id="1" name=""/>
+        <p:cNvGrpSpPr/>
+        <p:nvPr/>
+      </p:nvGrpSpPr>
+      <p:grpSpPr>
+        <a:xfrm>
+          <a:off x="0" y="0"/>
+          <a:ext cx="0" cy="0"/>
+          <a:chOff x="0" y="0"/>
+          <a:chExt cx="0" cy="0"/>
+        </a:xfrm>
+      </p:grpSpPr>
+      <p:pic>
+        <p:nvPicPr>
+          <p:cNvPr id="2050" name="Picture 2"/>
+          <p:cNvPicPr>
+            <a:picLocks noChangeAspect="1" noChangeArrowheads="1"/>
+          </p:cNvPicPr>
+          <p:nvPr/>
+        </p:nvPicPr>
+        <p:blipFill>
+          <a:blip r:embed="rId3">
+            <a:extLst>
+              <a:ext uri="{28A0092B-C50C-407E-A947-70E740481C1C}">
+                <a14:useLocalDpi xmlns:a14="http://schemas.microsoft.com/office/drawing/2010/main" val="0"/>
+              </a:ext>
+            </a:extLst>
+          </a:blip>
+          <a:srcRect/>
+          <a:stretch>
+            <a:fillRect/>
+          </a:stretch>
+        </p:blipFill>
+        <p:spPr bwMode="auto">
+          <a:xfrm rot="21242906">
+            <a:off x="889800" y="1065328"/>
+            <a:ext cx="3124200" cy="4097311"/>
+          </a:xfrm>
+          <a:prstGeom prst="rect">
+            <a:avLst/>
+          </a:prstGeom>
+          <a:solidFill>
+            <a:srgbClr val="FFFFFF">
+              <a:shade val="85000"/>
+            </a:srgbClr>
+          </a:solidFill>
+          <a:ln w="88900" cap="sq">
+            <a:solidFill>
+              <a:srgbClr val="FFFFFF"/>
+            </a:solidFill>
+            <a:miter lim="800000"/>
+          </a:ln>
+          <a:effectLst>
+            <a:outerShdw blurRad="55000" dist="18000" dir="5400000" algn="tl" rotWithShape="0">
+              <a:srgbClr val="000000">
+                <a:alpha val="40000"/>
+              </a:srgbClr>
+            </a:outerShdw>
+          </a:effectLst>
+          <a:scene3d>
+            <a:camera prst="orthographicFront"/>
+            <a:lightRig rig="twoPt" dir="t">
+              <a:rot lat="0" lon="0" rev="7200000"/>
+            </a:lightRig>
+          </a:scene3d>
+          <a:sp3d>
+            <a:bevelT w="25400" h="19050"/>
+            <a:contourClr>
+              <a:srgbClr val="FFFFFF"/>
+            </a:contourClr>
+          </a:sp3d>
+          <a:extLst/>
+        </p:spPr>
+      </p:pic>
+      <p:pic>
+        <p:nvPicPr>
+          <p:cNvPr id="2054" name="Picture 6"/>
+          <p:cNvPicPr>
+            <a:picLocks noChangeAspect="1" noChangeArrowheads="1"/>
+          </p:cNvPicPr>
+          <p:nvPr/>
+        </p:nvPicPr>
+        <p:blipFill>
+          <a:blip r:embed="rId4">
+            <a:extLst>
+              <a:ext uri="{28A0092B-C50C-407E-A947-70E740481C1C}">
+                <a14:useLocalDpi xmlns:a14="http://schemas.microsoft.com/office/drawing/2010/main" val="0"/>
+              </a:ext>
+            </a:extLst>
+          </a:blip>
+          <a:srcRect/>
+          <a:stretch>
+            <a:fillRect/>
+          </a:stretch>
+        </p:blipFill>
+        <p:spPr bwMode="auto">
+          <a:xfrm rot="248090">
+            <a:off x="5029200" y="328612"/>
+            <a:ext cx="3084513" cy="5743575"/>
+          </a:xfrm>
+          <a:prstGeom prst="rect">
+            <a:avLst/>
+          </a:prstGeom>
+          <a:solidFill>
+            <a:srgbClr val="FFFFFF">
+              <a:shade val="85000"/>
+            </a:srgbClr>
+          </a:solidFill>
+          <a:ln w="88900" cap="sq">
+            <a:solidFill>
+              <a:srgbClr val="FFFFFF"/>
+            </a:solidFill>
+            <a:miter lim="800000"/>
+          </a:ln>
+          <a:effectLst>
+            <a:outerShdw blurRad="55000" dist="18000" dir="5400000" algn="tl" rotWithShape="0">
+              <a:srgbClr val="000000">
+                <a:alpha val="40000"/>
+              </a:srgbClr>
+            </a:outerShdw>
+          </a:effectLst>
+          <a:scene3d>
+            <a:camera prst="orthographicFront"/>
+            <a:lightRig rig="twoPt" dir="t">
+              <a:rot lat="0" lon="0" rev="7200000"/>
+            </a:lightRig>
+          </a:scene3d>
+          <a:sp3d>
+            <a:bevelT w="25400" h="19050"/>
+            <a:contourClr>
+              <a:srgbClr val="FFFFFF"/>
+            </a:contourClr>
+          </a:sp3d>
+          <a:extLst/>
+        </p:spPr>
+      </p:pic>
+    </p:spTree>
+    <p:custDataLst>
+      <p:tags r:id="rId1"/>
+    </p:custDataLst>
+    <p:extLst>
+      <p:ext uri="{BB962C8B-B14F-4D97-AF65-F5344CB8AC3E}">
+        <p14:creationId xmlns:p14="http://schemas.microsoft.com/office/powerpoint/2010/main" val="580966386"/>
+      </p:ext>
+    </p:extLst>
+  </p:cSld>
+  <p:clrMapOvr>
+    <a:masterClrMapping/>
+  </p:clrMapOvr>
+</p:sld>
+</file>
+
+<file path=ppt/slides/slide8.xml><?xml version="1.0" encoding="utf-8"?>
+<p:sld xmlns:a="http://schemas.openxmlformats.org/drawingml/2006/main" xmlns:r="http://schemas.openxmlformats.org/officeDocument/2006/relationships" xmlns:p="http://schemas.openxmlformats.org/presentationml/2006/main">
+  <p:cSld>
+    <p:spTree>
+      <p:nvGrpSpPr>
+        <p:cNvPr id="1" name=""/>
+        <p:cNvGrpSpPr/>
+        <p:nvPr/>
+      </p:nvGrpSpPr>
+      <p:grpSpPr>
+        <a:xfrm>
+          <a:off x="0" y="0"/>
+          <a:ext cx="0" cy="0"/>
+          <a:chOff x="0" y="0"/>
+          <a:chExt cx="0" cy="0"/>
+        </a:xfrm>
+      </p:grpSpPr>
+      <p:pic>
+        <p:nvPicPr>
+          <p:cNvPr id="1027" name="Picture 3"/>
+          <p:cNvPicPr>
+            <a:picLocks noChangeAspect="1" noChangeArrowheads="1"/>
+          </p:cNvPicPr>
+          <p:nvPr/>
+        </p:nvPicPr>
+        <p:blipFill>
+          <a:blip r:embed="rId3">
+            <a:extLst>
+              <a:ext uri="{28A0092B-C50C-407E-A947-70E740481C1C}">
+                <a14:useLocalDpi xmlns:a14="http://schemas.microsoft.com/office/drawing/2010/main" val="0"/>
+              </a:ext>
+            </a:extLst>
+          </a:blip>
+          <a:srcRect/>
+          <a:stretch>
+            <a:fillRect/>
+          </a:stretch>
+        </p:blipFill>
+        <p:spPr bwMode="auto">
+          <a:xfrm rot="368572">
+            <a:off x="-393872" y="1831500"/>
+            <a:ext cx="3124200" cy="4199632"/>
+          </a:xfrm>
+          <a:prstGeom prst="rect">
+            <a:avLst/>
+          </a:prstGeom>
+          <a:solidFill>
+            <a:srgbClr val="FFFFFF">
+              <a:shade val="85000"/>
+            </a:srgbClr>
+          </a:solidFill>
+          <a:ln w="88900" cap="sq">
+            <a:solidFill>
+              <a:srgbClr val="FFFFFF"/>
+            </a:solidFill>
+            <a:miter lim="800000"/>
+          </a:ln>
+          <a:effectLst>
+            <a:outerShdw blurRad="55000" dist="18000" dir="5400000" algn="tl" rotWithShape="0">
+              <a:srgbClr val="000000">
+                <a:alpha val="40000"/>
+              </a:srgbClr>
+            </a:outerShdw>
+          </a:effectLst>
+          <a:scene3d>
+            <a:camera prst="orthographicFront"/>
+            <a:lightRig rig="twoPt" dir="t">
+              <a:rot lat="0" lon="0" rev="7200000"/>
+            </a:lightRig>
+          </a:scene3d>
+          <a:sp3d>
+            <a:bevelT w="25400" h="19050"/>
+            <a:contourClr>
+              <a:srgbClr val="FFFFFF"/>
+            </a:contourClr>
+          </a:sp3d>
+          <a:extLst/>
+        </p:spPr>
+      </p:pic>
+      <p:pic>
+        <p:nvPicPr>
+          <p:cNvPr id="1028" name="Picture 4"/>
+          <p:cNvPicPr>
+            <a:picLocks noChangeAspect="1" noChangeArrowheads="1"/>
+          </p:cNvPicPr>
+          <p:nvPr/>
+        </p:nvPicPr>
+        <p:blipFill>
+          <a:blip r:embed="rId4">
+            <a:extLst>
+              <a:ext uri="{28A0092B-C50C-407E-A947-70E740481C1C}">
+                <a14:useLocalDpi xmlns:a14="http://schemas.microsoft.com/office/drawing/2010/main" val="0"/>
+              </a:ext>
+            </a:extLst>
+          </a:blip>
+          <a:srcRect/>
+          <a:stretch>
+            <a:fillRect/>
+          </a:stretch>
+        </p:blipFill>
+        <p:spPr bwMode="auto">
+          <a:xfrm rot="711747">
+            <a:off x="1022007" y="2728488"/>
+            <a:ext cx="3027589" cy="2228096"/>
+          </a:xfrm>
+          <a:prstGeom prst="rect">
+            <a:avLst/>
+          </a:prstGeom>
+          <a:solidFill>
+            <a:srgbClr val="FFFFFF">
+              <a:shade val="85000"/>
+            </a:srgbClr>
+          </a:solidFill>
+          <a:ln w="88900" cap="sq">
+            <a:solidFill>
+              <a:srgbClr val="FFFFFF"/>
+            </a:solidFill>
+            <a:miter lim="800000"/>
+          </a:ln>
+          <a:effectLst>
+            <a:outerShdw blurRad="55000" dist="18000" dir="5400000" algn="tl" rotWithShape="0">
+              <a:srgbClr val="000000">
+                <a:alpha val="40000"/>
+              </a:srgbClr>
+            </a:outerShdw>
+          </a:effectLst>
+          <a:scene3d>
+            <a:camera prst="orthographicFront"/>
+            <a:lightRig rig="twoPt" dir="t">
+              <a:rot lat="0" lon="0" rev="7200000"/>
+            </a:lightRig>
+          </a:scene3d>
+          <a:sp3d>
+            <a:bevelT w="25400" h="19050"/>
+            <a:contourClr>
+              <a:srgbClr val="FFFFFF"/>
+            </a:contourClr>
+          </a:sp3d>
+          <a:extLst/>
+        </p:spPr>
+      </p:pic>
+      <p:pic>
+        <p:nvPicPr>
+          <p:cNvPr id="1029" name="Picture 5"/>
+          <p:cNvPicPr>
+            <a:picLocks noChangeAspect="1" noChangeArrowheads="1"/>
+          </p:cNvPicPr>
+          <p:nvPr/>
+        </p:nvPicPr>
+        <p:blipFill>
+          <a:blip r:embed="rId5">
+            <a:extLst>
+              <a:ext uri="{28A0092B-C50C-407E-A947-70E740481C1C}">
+                <a14:useLocalDpi xmlns:a14="http://schemas.microsoft.com/office/drawing/2010/main" val="0"/>
+              </a:ext>
+            </a:extLst>
+          </a:blip>
+          <a:srcRect/>
+          <a:stretch>
+            <a:fillRect/>
+          </a:stretch>
+        </p:blipFill>
+        <p:spPr bwMode="auto">
+          <a:xfrm>
+            <a:off x="4571206" y="914400"/>
+            <a:ext cx="5097463" cy="4743450"/>
+          </a:xfrm>
+          <a:prstGeom prst="rect">
+            <a:avLst/>
+          </a:prstGeom>
+          <a:noFill/>
+          <a:ln>
+            <a:noFill/>
+          </a:ln>
+          <a:effectLst/>
+          <a:extLst>
+            <a:ext uri="{909E8E84-426E-40DD-AFC4-6F175D3DCCD1}">
+              <a14:hiddenFill xmlns:a14="http://schemas.microsoft.com/office/drawing/2010/main">
+                <a:solidFill>
+                  <a:schemeClr val="accent1"/>
+                </a:solidFill>
+              </a14:hiddenFill>
+            </a:ext>
+            <a:ext uri="{91240B29-F687-4F45-9708-019B960494DF}">
+              <a14:hiddenLine xmlns:a14="http://schemas.microsoft.com/office/drawing/2010/main" w="9525">
+                <a:solidFill>
+                  <a:schemeClr val="tx1"/>
+                </a:solidFill>
+                <a:miter lim="800000"/>
+                <a:headEnd/>
+                <a:tailEnd/>
+              </a14:hiddenLine>
+            </a:ext>
+            <a:ext uri="{AF507438-7753-43E0-B8FC-AC1667EBCBE1}">
+              <a14:hiddenEffects xmlns:a14="http://schemas.microsoft.com/office/drawing/2010/main">
+                <a:effectLst>
+                  <a:outerShdw dist="35921" dir="2700000" algn="ctr" rotWithShape="0">
+                    <a:schemeClr val="bg2"/>
+                  </a:outerShdw>
+                </a:effectLst>
+              </a14:hiddenEffects>
+            </a:ext>
+          </a:extLst>
+        </p:spPr>
+      </p:pic>
+    </p:spTree>
+    <p:custDataLst>
+      <p:tags r:id="rId1"/>
+    </p:custDataLst>
+    <p:extLst>
+      <p:ext uri="{BB962C8B-B14F-4D97-AF65-F5344CB8AC3E}">
+        <p14:creationId xmlns:p14="http://schemas.microsoft.com/office/powerpoint/2010/main" val="2140840612"/>
+      </p:ext>
+    </p:extLst>
+  </p:cSld>
+  <p:clrMapOvr>
+    <a:masterClrMapping/>
+  </p:clrMapOvr>
+</p:sld>
+</file>
+
+<file path=ppt/slides/slide9.xml><?xml version="1.0" encoding="utf-8"?>
+<p:sld xmlns:a="http://schemas.openxmlformats.org/drawingml/2006/main" xmlns:r="http://schemas.openxmlformats.org/officeDocument/2006/relationships" xmlns:p="http://schemas.openxmlformats.org/presentationml/2006/main">
+  <p:cSld>
+    <p:spTree>
+      <p:nvGrpSpPr>
+        <p:cNvPr id="1" name=""/>
+        <p:cNvGrpSpPr/>
+        <p:nvPr/>
+      </p:nvGrpSpPr>
+      <p:grpSpPr>
+        <a:xfrm>
+          <a:off x="0" y="0"/>
+          <a:ext cx="0" cy="0"/>
+          <a:chOff x="0" y="0"/>
+          <a:chExt cx="0" cy="0"/>
+        </a:xfrm>
+      </p:grpSpPr>
+      <p:sp>
+        <p:nvSpPr>
+          <p:cNvPr id="2" name="TextBox 1"/>
+          <p:cNvSpPr txBox="1"/>
+          <p:nvPr/>
+        </p:nvSpPr>
+        <p:spPr>
+          <a:xfrm>
+            <a:off x="241300" y="1347607"/>
+            <a:ext cx="4800600" cy="646331"/>
+          </a:xfrm>
+          <a:prstGeom prst="rect">
+            <a:avLst/>
+          </a:prstGeom>
+          <a:noFill/>
+        </p:spPr>
+        <p:txBody>
+          <a:bodyPr wrap="square" rtlCol="0">
+            <a:spAutoFit/>
+          </a:bodyPr>
+          <a:lstStyle/>
+          <a:p>
+            <a:r>
+              <a:rPr lang="en-GB" dirty="0"/>
+              <a:t>Data for demonstration app kindly provided by </a:t>
+            </a:r>
+            <a:br>
+              <a:rPr lang="en-GB" dirty="0"/>
+            </a:br>
+            <a:r>
+              <a:rPr lang="en-GB" dirty="0" err="1"/>
+              <a:t>Dr.</a:t>
+            </a:r>
+            <a:r>
+              <a:rPr lang="en-GB" dirty="0"/>
+              <a:t> Evans O. </a:t>
+            </a:r>
+            <a:r>
+              <a:rPr lang="en-GB" dirty="0" err="1"/>
+              <a:t>Ouma</a:t>
+            </a:r>
+            <a:r>
+              <a:rPr lang="en-GB" dirty="0"/>
+              <a:t>, </a:t>
+            </a:r>
+            <a:r>
+              <a:rPr lang="en-GB" dirty="0" err="1"/>
+              <a:t>Rongo</a:t>
+            </a:r>
+            <a:r>
+              <a:rPr lang="en-GB" dirty="0"/>
+              <a:t> University College</a:t>
+            </a:r>
+          </a:p>
+        </p:txBody>
+      </p:sp>
+      <p:pic>
+        <p:nvPicPr>
+          <p:cNvPr id="3074" name="Picture 2" descr="http://192.168.0.75:8100/img/suppliers/Rongo%20University%20College.jpg"/>
+          <p:cNvPicPr>
+            <a:picLocks noChangeAspect="1" noChangeArrowheads="1"/>
+          </p:cNvPicPr>
+          <p:nvPr/>
+        </p:nvPicPr>
+        <p:blipFill>
+          <a:blip r:embed="rId3" cstate="print">
+            <a:clrChange>
+              <a:clrFrom>
+                <a:srgbClr val="FFFFFF"/>
+              </a:clrFrom>
+              <a:clrTo>
+                <a:srgbClr val="FFFFFF">
+                  <a:alpha val="0"/>
+                </a:srgbClr>
+              </a:clrTo>
+            </a:clrChange>
+            <a:extLst>
+              <a:ext uri="{28A0092B-C50C-407E-A947-70E740481C1C}">
+                <a14:useLocalDpi xmlns:a14="http://schemas.microsoft.com/office/drawing/2010/main" val="0"/>
+              </a:ext>
+            </a:extLst>
+          </a:blip>
+          <a:srcRect/>
+          <a:stretch>
+            <a:fillRect/>
+          </a:stretch>
+        </p:blipFill>
+        <p:spPr bwMode="auto">
+          <a:xfrm>
+            <a:off x="241300" y="606223"/>
+            <a:ext cx="2724150" cy="741384"/>
+          </a:xfrm>
+          <a:prstGeom prst="rect">
+            <a:avLst/>
+          </a:prstGeom>
+          <a:noFill/>
+          <a:extLst>
+            <a:ext uri="{909E8E84-426E-40DD-AFC4-6F175D3DCCD1}">
+              <a14:hiddenFill xmlns:a14="http://schemas.microsoft.com/office/drawing/2010/main">
+                <a:solidFill>
+                  <a:srgbClr val="FFFFFF"/>
+                </a:solidFill>
+              </a14:hiddenFill>
+            </a:ext>
+          </a:extLst>
+        </p:spPr>
+      </p:pic>
+      <p:sp>
+        <p:nvSpPr>
+          <p:cNvPr id="4" name="TextBox 3"/>
+          <p:cNvSpPr txBox="1"/>
+          <p:nvPr/>
+        </p:nvSpPr>
+        <p:spPr>
+          <a:xfrm>
+            <a:off x="228600" y="3180146"/>
+            <a:ext cx="4570213" cy="923330"/>
+          </a:xfrm>
+          <a:prstGeom prst="rect">
+            <a:avLst/>
+          </a:prstGeom>
+          <a:noFill/>
+        </p:spPr>
+        <p:txBody>
+          <a:bodyPr wrap="square" rtlCol="0">
+            <a:spAutoFit/>
+          </a:bodyPr>
+          <a:lstStyle/>
+          <a:p>
+            <a:r>
+              <a:rPr lang="en-GB" dirty="0"/>
+              <a:t>App developed by the Statistical Services Centre, University of Reading. Source code available on GitHub</a:t>
+            </a:r>
+          </a:p>
+        </p:txBody>
+      </p:sp>
+      <p:pic>
+        <p:nvPicPr>
+          <p:cNvPr id="3076" name="Picture 4" descr="http://www.reading.ac.uk/ssc/images/SscLogo.png"/>
+          <p:cNvPicPr>
+            <a:picLocks noChangeAspect="1" noChangeArrowheads="1"/>
+          </p:cNvPicPr>
+          <p:nvPr/>
+        </p:nvPicPr>
+        <p:blipFill>
+          <a:blip r:embed="rId4" cstate="print">
+            <a:extLst>
+              <a:ext uri="{28A0092B-C50C-407E-A947-70E740481C1C}">
+                <a14:useLocalDpi xmlns:a14="http://schemas.microsoft.com/office/drawing/2010/main" val="0"/>
+              </a:ext>
+            </a:extLst>
+          </a:blip>
+          <a:srcRect/>
+          <a:stretch>
+            <a:fillRect/>
+          </a:stretch>
+        </p:blipFill>
+        <p:spPr bwMode="auto">
+          <a:xfrm>
+            <a:off x="241300" y="2408774"/>
+            <a:ext cx="718475" cy="718475"/>
+          </a:xfrm>
+          <a:prstGeom prst="rect">
+            <a:avLst/>
+          </a:prstGeom>
+          <a:noFill/>
+          <a:extLst>
+            <a:ext uri="{909E8E84-426E-40DD-AFC4-6F175D3DCCD1}">
+              <a14:hiddenFill xmlns:a14="http://schemas.microsoft.com/office/drawing/2010/main">
+                <a:solidFill>
+                  <a:srgbClr val="FFFFFF"/>
+                </a:solidFill>
+              </a14:hiddenFill>
+            </a:ext>
+          </a:extLst>
+        </p:spPr>
+      </p:pic>
+      <p:pic>
+        <p:nvPicPr>
+          <p:cNvPr id="3078" name="Picture 6" descr="http://www.reading.ac.uk/ssc/images/UorLogo.png"/>
+          <p:cNvPicPr>
+            <a:picLocks noChangeAspect="1" noChangeArrowheads="1"/>
+          </p:cNvPicPr>
+          <p:nvPr/>
+        </p:nvPicPr>
+        <p:blipFill>
+          <a:blip r:embed="rId5">
+            <a:extLst>
+              <a:ext uri="{28A0092B-C50C-407E-A947-70E740481C1C}">
+                <a14:useLocalDpi xmlns:a14="http://schemas.microsoft.com/office/drawing/2010/main" val="0"/>
+              </a:ext>
+            </a:extLst>
+          </a:blip>
+          <a:srcRect/>
+          <a:stretch>
+            <a:fillRect/>
+          </a:stretch>
+        </p:blipFill>
+        <p:spPr bwMode="auto">
+          <a:xfrm>
+            <a:off x="1141213" y="2408775"/>
+            <a:ext cx="2171700" cy="786430"/>
+          </a:xfrm>
+          <a:prstGeom prst="rect">
+            <a:avLst/>
+          </a:prstGeom>
+          <a:noFill/>
+          <a:extLst>
+            <a:ext uri="{909E8E84-426E-40DD-AFC4-6F175D3DCCD1}">
+              <a14:hiddenFill xmlns:a14="http://schemas.microsoft.com/office/drawing/2010/main">
+                <a:solidFill>
+                  <a:srgbClr val="FFFFFF"/>
+                </a:solidFill>
+              </a14:hiddenFill>
+            </a:ext>
+          </a:extLst>
+        </p:spPr>
+      </p:pic>
+      <p:pic>
+        <p:nvPicPr>
+          <p:cNvPr id="3081" name="Picture 9"/>
+          <p:cNvPicPr>
+            <a:picLocks noChangeAspect="1" noChangeArrowheads="1"/>
+          </p:cNvPicPr>
+          <p:nvPr/>
+        </p:nvPicPr>
+        <p:blipFill>
+          <a:blip r:embed="rId6">
+            <a:extLst>
+              <a:ext uri="{28A0092B-C50C-407E-A947-70E740481C1C}">
+                <a14:useLocalDpi xmlns:a14="http://schemas.microsoft.com/office/drawing/2010/main" val="0"/>
+              </a:ext>
+            </a:extLst>
+          </a:blip>
+          <a:srcRect/>
+          <a:stretch>
+            <a:fillRect/>
+          </a:stretch>
+        </p:blipFill>
+        <p:spPr bwMode="auto">
+          <a:xfrm>
+            <a:off x="5334000" y="1519262"/>
+            <a:ext cx="5105400" cy="3767836"/>
+          </a:xfrm>
+          <a:prstGeom prst="rect">
+            <a:avLst/>
+          </a:prstGeom>
+          <a:solidFill>
+            <a:srgbClr val="FFFFFF">
+              <a:shade val="85000"/>
+            </a:srgbClr>
+          </a:solidFill>
+          <a:ln w="88900" cap="sq">
+            <a:solidFill>
+              <a:srgbClr val="FFFFFF"/>
+            </a:solidFill>
+            <a:miter lim="800000"/>
+          </a:ln>
+          <a:effectLst>
+            <a:outerShdw blurRad="55000" dist="18000" dir="5400000" algn="tl" rotWithShape="0">
+              <a:srgbClr val="000000">
+                <a:alpha val="40000"/>
+              </a:srgbClr>
+            </a:outerShdw>
+          </a:effectLst>
+          <a:scene3d>
+            <a:camera prst="orthographicFront"/>
+            <a:lightRig rig="twoPt" dir="t">
+              <a:rot lat="0" lon="0" rev="7200000"/>
+            </a:lightRig>
+          </a:scene3d>
+          <a:sp3d>
+            <a:bevelT w="25400" h="19050"/>
+            <a:contourClr>
+              <a:srgbClr val="FFFFFF"/>
+            </a:contourClr>
+          </a:sp3d>
+          <a:extLst/>
+        </p:spPr>
+      </p:pic>
+    </p:spTree>
+    <p:custDataLst>
+      <p:tags r:id="rId1"/>
+    </p:custDataLst>
+    <p:extLst>
+      <p:ext uri="{BB962C8B-B14F-4D97-AF65-F5344CB8AC3E}">
+        <p14:creationId xmlns:p14="http://schemas.microsoft.com/office/powerpoint/2010/main" val="1749249616"/>
       </p:ext>
     </p:extLst>
   </p:cSld>

</xml_diff>